<commit_message>
Alteração no artefato 15 para adequar-se ao novo projeto
</commit_message>
<xml_diff>
--- a/Artefatos/15 - Arquitetura de Negócio para cada Cenário.pptx
+++ b/Artefatos/15 - Arquitetura de Negócio para cada Cenário.pptx
@@ -5,7 +5,7 @@
     <p:sldMasterId id="2147483648" r:id="rId1"/>
   </p:sldMasterIdLst>
   <p:notesMasterIdLst>
-    <p:notesMasterId r:id="rId8"/>
+    <p:notesMasterId r:id="rId9"/>
   </p:notesMasterIdLst>
   <p:sldIdLst>
     <p:sldId id="257" r:id="rId2"/>
@@ -14,6 +14,7 @@
     <p:sldId id="262" r:id="rId5"/>
     <p:sldId id="260" r:id="rId6"/>
     <p:sldId id="261" r:id="rId7"/>
+    <p:sldId id="263" r:id="rId8"/>
   </p:sldIdLst>
   <p:sldSz cx="9144000" cy="6858000" type="screen4x3"/>
   <p:notesSz cx="6858000" cy="9144000"/>
@@ -112,7 +113,302 @@
       </a:defRPr>
     </a:lvl9pPr>
   </p:defaultTextStyle>
+  <p:extLst>
+    <p:ext uri="{EFAFB233-063F-42B5-8137-9DF3F51BA10A}">
+      <p15:sldGuideLst xmlns:p15="http://schemas.microsoft.com/office/powerpoint/2012/main">
+        <p15:guide id="1" orient="horz" pos="2160">
+          <p15:clr>
+            <a:srgbClr val="A4A3A4"/>
+          </p15:clr>
+        </p15:guide>
+        <p15:guide id="2" pos="2880">
+          <p15:clr>
+            <a:srgbClr val="A4A3A4"/>
+          </p15:clr>
+        </p15:guide>
+      </p15:sldGuideLst>
+    </p:ext>
+  </p:extLst>
 </p:presentation>
+</file>
+
+<file path=ppt/revisionInfo.xml><?xml version="1.0" encoding="utf-8"?>
+<p1510:revInfo xmlns:a="http://schemas.openxmlformats.org/drawingml/2006/main" xmlns:r="http://schemas.openxmlformats.org/officeDocument/2006/relationships" xmlns:p1510="http://schemas.microsoft.com/office/powerpoint/2015/10/main">
+  <p1510:revLst>
+    <p1510:client id="{61F3FE0D-A57B-43EB-BDF0-4569B707A8FE}" v="13" dt="2021-03-30T19:33:18.001"/>
+  </p1510:revLst>
+</p1510:revInfo>
+</file>
+
+<file path=ppt/changesInfos/changesInfo1.xml><?xml version="1.0" encoding="utf-8"?>
+<pc:chgInfo xmlns:a="http://schemas.openxmlformats.org/drawingml/2006/main" xmlns:r="http://schemas.openxmlformats.org/officeDocument/2006/relationships" xmlns:ac="http://schemas.microsoft.com/office/drawing/2013/main/command" xmlns:pc="http://schemas.microsoft.com/office/powerpoint/2013/main/command">
+  <pc:docChgLst>
+    <pc:chgData name="Leonardo Zabotto" userId="e90e968d6f8cb6a5" providerId="LiveId" clId="{61F3FE0D-A57B-43EB-BDF0-4569B707A8FE}"/>
+    <pc:docChg chg="undo custSel addSld modSld">
+      <pc:chgData name="Leonardo Zabotto" userId="e90e968d6f8cb6a5" providerId="LiveId" clId="{61F3FE0D-A57B-43EB-BDF0-4569B707A8FE}" dt="2021-03-30T19:33:42.998" v="280" actId="1076"/>
+      <pc:docMkLst>
+        <pc:docMk/>
+      </pc:docMkLst>
+      <pc:sldChg chg="addSp delSp modSp mod">
+        <pc:chgData name="Leonardo Zabotto" userId="e90e968d6f8cb6a5" providerId="LiveId" clId="{61F3FE0D-A57B-43EB-BDF0-4569B707A8FE}" dt="2021-03-30T19:19:09.528" v="16" actId="1076"/>
+        <pc:sldMkLst>
+          <pc:docMk/>
+          <pc:sldMk cId="4091421577" sldId="257"/>
+        </pc:sldMkLst>
+        <pc:picChg chg="del">
+          <ac:chgData name="Leonardo Zabotto" userId="e90e968d6f8cb6a5" providerId="LiveId" clId="{61F3FE0D-A57B-43EB-BDF0-4569B707A8FE}" dt="2021-03-30T19:18:38.650" v="0" actId="478"/>
+          <ac:picMkLst>
+            <pc:docMk/>
+            <pc:sldMk cId="4091421577" sldId="257"/>
+            <ac:picMk id="2" creationId="{00000000-0000-0000-0000-000000000000}"/>
+          </ac:picMkLst>
+        </pc:picChg>
+        <pc:picChg chg="add mod">
+          <ac:chgData name="Leonardo Zabotto" userId="e90e968d6f8cb6a5" providerId="LiveId" clId="{61F3FE0D-A57B-43EB-BDF0-4569B707A8FE}" dt="2021-03-30T19:19:09.528" v="16" actId="1076"/>
+          <ac:picMkLst>
+            <pc:docMk/>
+            <pc:sldMk cId="4091421577" sldId="257"/>
+            <ac:picMk id="4" creationId="{366B3D47-BBF0-4D29-A8BE-33A00EA622B6}"/>
+          </ac:picMkLst>
+        </pc:picChg>
+      </pc:sldChg>
+      <pc:sldChg chg="addSp delSp modSp mod">
+        <pc:chgData name="Leonardo Zabotto" userId="e90e968d6f8cb6a5" providerId="LiveId" clId="{61F3FE0D-A57B-43EB-BDF0-4569B707A8FE}" dt="2021-03-30T19:21:30.439" v="57" actId="1076"/>
+        <pc:sldMkLst>
+          <pc:docMk/>
+          <pc:sldMk cId="2194731258" sldId="258"/>
+        </pc:sldMkLst>
+        <pc:spChg chg="mod">
+          <ac:chgData name="Leonardo Zabotto" userId="e90e968d6f8cb6a5" providerId="LiveId" clId="{61F3FE0D-A57B-43EB-BDF0-4569B707A8FE}" dt="2021-03-30T19:20:10.096" v="44" actId="20577"/>
+          <ac:spMkLst>
+            <pc:docMk/>
+            <pc:sldMk cId="2194731258" sldId="258"/>
+            <ac:spMk id="4" creationId="{00000000-0000-0000-0000-000000000000}"/>
+          </ac:spMkLst>
+        </pc:spChg>
+        <pc:picChg chg="del mod">
+          <ac:chgData name="Leonardo Zabotto" userId="e90e968d6f8cb6a5" providerId="LiveId" clId="{61F3FE0D-A57B-43EB-BDF0-4569B707A8FE}" dt="2021-03-30T19:20:03.513" v="19" actId="478"/>
+          <ac:picMkLst>
+            <pc:docMk/>
+            <pc:sldMk cId="2194731258" sldId="258"/>
+            <ac:picMk id="3" creationId="{00000000-0000-0000-0000-000000000000}"/>
+          </ac:picMkLst>
+        </pc:picChg>
+        <pc:picChg chg="add del mod">
+          <ac:chgData name="Leonardo Zabotto" userId="e90e968d6f8cb6a5" providerId="LiveId" clId="{61F3FE0D-A57B-43EB-BDF0-4569B707A8FE}" dt="2021-03-30T19:21:07.383" v="50" actId="478"/>
+          <ac:picMkLst>
+            <pc:docMk/>
+            <pc:sldMk cId="2194731258" sldId="258"/>
+            <ac:picMk id="5" creationId="{7805D2DC-83C2-42CF-A66A-A2CDAB2581E5}"/>
+          </ac:picMkLst>
+        </pc:picChg>
+        <pc:picChg chg="add mod">
+          <ac:chgData name="Leonardo Zabotto" userId="e90e968d6f8cb6a5" providerId="LiveId" clId="{61F3FE0D-A57B-43EB-BDF0-4569B707A8FE}" dt="2021-03-30T19:21:30.439" v="57" actId="1076"/>
+          <ac:picMkLst>
+            <pc:docMk/>
+            <pc:sldMk cId="2194731258" sldId="258"/>
+            <ac:picMk id="7" creationId="{C49313D5-A1B3-4501-BC6F-616438DEAE7B}"/>
+          </ac:picMkLst>
+        </pc:picChg>
+      </pc:sldChg>
+      <pc:sldChg chg="addSp delSp modSp mod">
+        <pc:chgData name="Leonardo Zabotto" userId="e90e968d6f8cb6a5" providerId="LiveId" clId="{61F3FE0D-A57B-43EB-BDF0-4569B707A8FE}" dt="2021-03-30T19:25:37.423" v="113" actId="1076"/>
+        <pc:sldMkLst>
+          <pc:docMk/>
+          <pc:sldMk cId="1967559346" sldId="259"/>
+        </pc:sldMkLst>
+        <pc:spChg chg="mod">
+          <ac:chgData name="Leonardo Zabotto" userId="e90e968d6f8cb6a5" providerId="LiveId" clId="{61F3FE0D-A57B-43EB-BDF0-4569B707A8FE}" dt="2021-03-30T19:22:13.024" v="72" actId="20577"/>
+          <ac:spMkLst>
+            <pc:docMk/>
+            <pc:sldMk cId="1967559346" sldId="259"/>
+            <ac:spMk id="3" creationId="{00000000-0000-0000-0000-000000000000}"/>
+          </ac:spMkLst>
+        </pc:spChg>
+        <pc:picChg chg="del">
+          <ac:chgData name="Leonardo Zabotto" userId="e90e968d6f8cb6a5" providerId="LiveId" clId="{61F3FE0D-A57B-43EB-BDF0-4569B707A8FE}" dt="2021-03-30T19:22:14.584" v="73" actId="478"/>
+          <ac:picMkLst>
+            <pc:docMk/>
+            <pc:sldMk cId="1967559346" sldId="259"/>
+            <ac:picMk id="4" creationId="{00000000-0000-0000-0000-000000000000}"/>
+          </ac:picMkLst>
+        </pc:picChg>
+        <pc:picChg chg="add del mod">
+          <ac:chgData name="Leonardo Zabotto" userId="e90e968d6f8cb6a5" providerId="LiveId" clId="{61F3FE0D-A57B-43EB-BDF0-4569B707A8FE}" dt="2021-03-30T19:22:21.689" v="79" actId="478"/>
+          <ac:picMkLst>
+            <pc:docMk/>
+            <pc:sldMk cId="1967559346" sldId="259"/>
+            <ac:picMk id="5" creationId="{9B84E78B-E223-43D4-B21E-8AD33AE1C277}"/>
+          </ac:picMkLst>
+        </pc:picChg>
+        <pc:picChg chg="add del mod">
+          <ac:chgData name="Leonardo Zabotto" userId="e90e968d6f8cb6a5" providerId="LiveId" clId="{61F3FE0D-A57B-43EB-BDF0-4569B707A8FE}" dt="2021-03-30T19:23:22.976" v="82" actId="478"/>
+          <ac:picMkLst>
+            <pc:docMk/>
+            <pc:sldMk cId="1967559346" sldId="259"/>
+            <ac:picMk id="7" creationId="{DB698E98-918E-41E0-8A10-A835DE60E321}"/>
+          </ac:picMkLst>
+        </pc:picChg>
+        <pc:picChg chg="add del mod">
+          <ac:chgData name="Leonardo Zabotto" userId="e90e968d6f8cb6a5" providerId="LiveId" clId="{61F3FE0D-A57B-43EB-BDF0-4569B707A8FE}" dt="2021-03-30T19:24:19.840" v="87" actId="478"/>
+          <ac:picMkLst>
+            <pc:docMk/>
+            <pc:sldMk cId="1967559346" sldId="259"/>
+            <ac:picMk id="9" creationId="{EA818C43-33F2-4A29-9C51-930C6C9880D1}"/>
+          </ac:picMkLst>
+        </pc:picChg>
+        <pc:picChg chg="add del mod modCrop">
+          <ac:chgData name="Leonardo Zabotto" userId="e90e968d6f8cb6a5" providerId="LiveId" clId="{61F3FE0D-A57B-43EB-BDF0-4569B707A8FE}" dt="2021-03-30T19:25:14.977" v="98" actId="478"/>
+          <ac:picMkLst>
+            <pc:docMk/>
+            <pc:sldMk cId="1967559346" sldId="259"/>
+            <ac:picMk id="11" creationId="{407908D6-34D6-4F91-85FE-BF91EDF3F75E}"/>
+          </ac:picMkLst>
+        </pc:picChg>
+        <pc:picChg chg="add mod modCrop">
+          <ac:chgData name="Leonardo Zabotto" userId="e90e968d6f8cb6a5" providerId="LiveId" clId="{61F3FE0D-A57B-43EB-BDF0-4569B707A8FE}" dt="2021-03-30T19:25:37.423" v="113" actId="1076"/>
+          <ac:picMkLst>
+            <pc:docMk/>
+            <pc:sldMk cId="1967559346" sldId="259"/>
+            <ac:picMk id="13" creationId="{384C644D-0FA7-4F0E-957A-B72E1345C62C}"/>
+          </ac:picMkLst>
+        </pc:picChg>
+      </pc:sldChg>
+      <pc:sldChg chg="addSp delSp modSp mod">
+        <pc:chgData name="Leonardo Zabotto" userId="e90e968d6f8cb6a5" providerId="LiveId" clId="{61F3FE0D-A57B-43EB-BDF0-4569B707A8FE}" dt="2021-03-30T19:29:07.527" v="190" actId="1076"/>
+        <pc:sldMkLst>
+          <pc:docMk/>
+          <pc:sldMk cId="2204209709" sldId="260"/>
+        </pc:sldMkLst>
+        <pc:spChg chg="mod">
+          <ac:chgData name="Leonardo Zabotto" userId="e90e968d6f8cb6a5" providerId="LiveId" clId="{61F3FE0D-A57B-43EB-BDF0-4569B707A8FE}" dt="2021-03-30T19:28:16.064" v="183" actId="20577"/>
+          <ac:spMkLst>
+            <pc:docMk/>
+            <pc:sldMk cId="2204209709" sldId="260"/>
+            <ac:spMk id="3" creationId="{00000000-0000-0000-0000-000000000000}"/>
+          </ac:spMkLst>
+        </pc:spChg>
+        <pc:picChg chg="del">
+          <ac:chgData name="Leonardo Zabotto" userId="e90e968d6f8cb6a5" providerId="LiveId" clId="{61F3FE0D-A57B-43EB-BDF0-4569B707A8FE}" dt="2021-03-30T19:27:53.064" v="156" actId="478"/>
+          <ac:picMkLst>
+            <pc:docMk/>
+            <pc:sldMk cId="2204209709" sldId="260"/>
+            <ac:picMk id="2" creationId="{00000000-0000-0000-0000-000000000000}"/>
+          </ac:picMkLst>
+        </pc:picChg>
+        <pc:picChg chg="add mod">
+          <ac:chgData name="Leonardo Zabotto" userId="e90e968d6f8cb6a5" providerId="LiveId" clId="{61F3FE0D-A57B-43EB-BDF0-4569B707A8FE}" dt="2021-03-30T19:29:07.527" v="190" actId="1076"/>
+          <ac:picMkLst>
+            <pc:docMk/>
+            <pc:sldMk cId="2204209709" sldId="260"/>
+            <ac:picMk id="5" creationId="{DE0BE3FA-D448-4B30-828F-4FCEFEE94C33}"/>
+          </ac:picMkLst>
+        </pc:picChg>
+      </pc:sldChg>
+      <pc:sldChg chg="addSp delSp modSp mod">
+        <pc:chgData name="Leonardo Zabotto" userId="e90e968d6f8cb6a5" providerId="LiveId" clId="{61F3FE0D-A57B-43EB-BDF0-4569B707A8FE}" dt="2021-03-30T19:31:37.654" v="244" actId="1076"/>
+        <pc:sldMkLst>
+          <pc:docMk/>
+          <pc:sldMk cId="1317682410" sldId="261"/>
+        </pc:sldMkLst>
+        <pc:spChg chg="mod">
+          <ac:chgData name="Leonardo Zabotto" userId="e90e968d6f8cb6a5" providerId="LiveId" clId="{61F3FE0D-A57B-43EB-BDF0-4569B707A8FE}" dt="2021-03-30T19:31:21.824" v="236" actId="20577"/>
+          <ac:spMkLst>
+            <pc:docMk/>
+            <pc:sldMk cId="1317682410" sldId="261"/>
+            <ac:spMk id="3" creationId="{00000000-0000-0000-0000-000000000000}"/>
+          </ac:spMkLst>
+        </pc:spChg>
+        <pc:picChg chg="del">
+          <ac:chgData name="Leonardo Zabotto" userId="e90e968d6f8cb6a5" providerId="LiveId" clId="{61F3FE0D-A57B-43EB-BDF0-4569B707A8FE}" dt="2021-03-30T19:31:23.663" v="237" actId="478"/>
+          <ac:picMkLst>
+            <pc:docMk/>
+            <pc:sldMk cId="1317682410" sldId="261"/>
+            <ac:picMk id="2" creationId="{00000000-0000-0000-0000-000000000000}"/>
+          </ac:picMkLst>
+        </pc:picChg>
+        <pc:picChg chg="add mod">
+          <ac:chgData name="Leonardo Zabotto" userId="e90e968d6f8cb6a5" providerId="LiveId" clId="{61F3FE0D-A57B-43EB-BDF0-4569B707A8FE}" dt="2021-03-30T19:31:37.654" v="244" actId="1076"/>
+          <ac:picMkLst>
+            <pc:docMk/>
+            <pc:sldMk cId="1317682410" sldId="261"/>
+            <ac:picMk id="5" creationId="{08605365-73D4-49F2-8B29-13B48B533776}"/>
+          </ac:picMkLst>
+        </pc:picChg>
+      </pc:sldChg>
+      <pc:sldChg chg="addSp delSp modSp mod">
+        <pc:chgData name="Leonardo Zabotto" userId="e90e968d6f8cb6a5" providerId="LiveId" clId="{61F3FE0D-A57B-43EB-BDF0-4569B707A8FE}" dt="2021-03-30T19:27:15.807" v="155" actId="1076"/>
+        <pc:sldMkLst>
+          <pc:docMk/>
+          <pc:sldMk cId="1118929194" sldId="262"/>
+        </pc:sldMkLst>
+        <pc:spChg chg="mod">
+          <ac:chgData name="Leonardo Zabotto" userId="e90e968d6f8cb6a5" providerId="LiveId" clId="{61F3FE0D-A57B-43EB-BDF0-4569B707A8FE}" dt="2021-03-30T19:27:08.944" v="153" actId="20577"/>
+          <ac:spMkLst>
+            <pc:docMk/>
+            <pc:sldMk cId="1118929194" sldId="262"/>
+            <ac:spMk id="3" creationId="{00000000-0000-0000-0000-000000000000}"/>
+          </ac:spMkLst>
+        </pc:spChg>
+        <pc:picChg chg="del">
+          <ac:chgData name="Leonardo Zabotto" userId="e90e968d6f8cb6a5" providerId="LiveId" clId="{61F3FE0D-A57B-43EB-BDF0-4569B707A8FE}" dt="2021-03-30T19:25:45.793" v="114" actId="478"/>
+          <ac:picMkLst>
+            <pc:docMk/>
+            <pc:sldMk cId="1118929194" sldId="262"/>
+            <ac:picMk id="4" creationId="{00000000-0000-0000-0000-000000000000}"/>
+          </ac:picMkLst>
+        </pc:picChg>
+        <pc:picChg chg="add mod modCrop">
+          <ac:chgData name="Leonardo Zabotto" userId="e90e968d6f8cb6a5" providerId="LiveId" clId="{61F3FE0D-A57B-43EB-BDF0-4569B707A8FE}" dt="2021-03-30T19:27:15.807" v="155" actId="1076"/>
+          <ac:picMkLst>
+            <pc:docMk/>
+            <pc:sldMk cId="1118929194" sldId="262"/>
+            <ac:picMk id="5" creationId="{67AAD100-0D84-4C72-A1BE-2594F7A257E0}"/>
+          </ac:picMkLst>
+        </pc:picChg>
+      </pc:sldChg>
+      <pc:sldChg chg="addSp delSp modSp add mod">
+        <pc:chgData name="Leonardo Zabotto" userId="e90e968d6f8cb6a5" providerId="LiveId" clId="{61F3FE0D-A57B-43EB-BDF0-4569B707A8FE}" dt="2021-03-30T19:33:42.998" v="280" actId="1076"/>
+        <pc:sldMkLst>
+          <pc:docMk/>
+          <pc:sldMk cId="133914596" sldId="263"/>
+        </pc:sldMkLst>
+        <pc:spChg chg="mod">
+          <ac:chgData name="Leonardo Zabotto" userId="e90e968d6f8cb6a5" providerId="LiveId" clId="{61F3FE0D-A57B-43EB-BDF0-4569B707A8FE}" dt="2021-03-30T19:31:52.600" v="260" actId="20577"/>
+          <ac:spMkLst>
+            <pc:docMk/>
+            <pc:sldMk cId="133914596" sldId="263"/>
+            <ac:spMk id="3" creationId="{00000000-0000-0000-0000-000000000000}"/>
+          </ac:spMkLst>
+        </pc:spChg>
+        <pc:picChg chg="add del mod">
+          <ac:chgData name="Leonardo Zabotto" userId="e90e968d6f8cb6a5" providerId="LiveId" clId="{61F3FE0D-A57B-43EB-BDF0-4569B707A8FE}" dt="2021-03-30T19:33:16.823" v="270" actId="478"/>
+          <ac:picMkLst>
+            <pc:docMk/>
+            <pc:sldMk cId="133914596" sldId="263"/>
+            <ac:picMk id="4" creationId="{FAFCAAAA-186B-4432-BC16-2176CFFD7131}"/>
+          </ac:picMkLst>
+        </pc:picChg>
+        <pc:picChg chg="del">
+          <ac:chgData name="Leonardo Zabotto" userId="e90e968d6f8cb6a5" providerId="LiveId" clId="{61F3FE0D-A57B-43EB-BDF0-4569B707A8FE}" dt="2021-03-30T19:31:53.976" v="261" actId="478"/>
+          <ac:picMkLst>
+            <pc:docMk/>
+            <pc:sldMk cId="133914596" sldId="263"/>
+            <ac:picMk id="5" creationId="{08605365-73D4-49F2-8B29-13B48B533776}"/>
+          </ac:picMkLst>
+        </pc:picChg>
+        <pc:picChg chg="add mod">
+          <ac:chgData name="Leonardo Zabotto" userId="e90e968d6f8cb6a5" providerId="LiveId" clId="{61F3FE0D-A57B-43EB-BDF0-4569B707A8FE}" dt="2021-03-30T19:33:42.998" v="280" actId="1076"/>
+          <ac:picMkLst>
+            <pc:docMk/>
+            <pc:sldMk cId="133914596" sldId="263"/>
+            <ac:picMk id="7" creationId="{FF66E299-9BC2-40E3-852F-7A848AB656A7}"/>
+          </ac:picMkLst>
+        </pc:picChg>
+      </pc:sldChg>
+    </pc:docChg>
+  </pc:docChgLst>
+</pc:chgInfo>
 </file>
 
 <file path=ppt/notesMasters/notesMaster1.xml><?xml version="1.0" encoding="utf-8"?>
@@ -197,7 +493,7 @@
           <a:p>
             <a:fld id="{F746C99E-1662-4343-82EB-EE2952C19028}" type="datetimeFigureOut">
               <a:rPr lang="pt-BR" smtClean="0"/>
-              <a:t>26/02/2021</a:t>
+              <a:t>30/03/2021</a:t>
             </a:fld>
             <a:endParaRPr lang="pt-BR"/>
           </a:p>
@@ -261,38 +557,37 @@
           <a:p>
             <a:pPr lvl="0"/>
             <a:r>
-              <a:rPr lang="pt-BR" smtClean="0"/>
+              <a:rPr lang="pt-BR"/>
               <a:t>Clique para editar o texto mestre</a:t>
             </a:r>
           </a:p>
           <a:p>
             <a:pPr lvl="1"/>
             <a:r>
-              <a:rPr lang="pt-BR" smtClean="0"/>
+              <a:rPr lang="pt-BR"/>
               <a:t>Segundo nível</a:t>
             </a:r>
           </a:p>
           <a:p>
             <a:pPr lvl="2"/>
             <a:r>
-              <a:rPr lang="pt-BR" smtClean="0"/>
+              <a:rPr lang="pt-BR"/>
               <a:t>Terceiro nível</a:t>
             </a:r>
           </a:p>
           <a:p>
             <a:pPr lvl="3"/>
             <a:r>
-              <a:rPr lang="pt-BR" smtClean="0"/>
+              <a:rPr lang="pt-BR"/>
               <a:t>Quarto nível</a:t>
             </a:r>
           </a:p>
           <a:p>
             <a:pPr lvl="4"/>
             <a:r>
-              <a:rPr lang="pt-BR" smtClean="0"/>
+              <a:rPr lang="pt-BR"/>
               <a:t>Quinto nível</a:t>
             </a:r>
-            <a:endParaRPr lang="pt-BR"/>
           </a:p>
         </p:txBody>
       </p:sp>
@@ -587,10 +882,9 @@
           <a:lstStyle/>
           <a:p>
             <a:r>
-              <a:rPr lang="pt-BR" smtClean="0"/>
+              <a:rPr lang="pt-BR"/>
               <a:t>Clique para editar o título mestre</a:t>
             </a:r>
-            <a:endParaRPr lang="pt-BR"/>
           </a:p>
         </p:txBody>
       </p:sp>
@@ -706,10 +1000,9 @@
           </a:lstStyle>
           <a:p>
             <a:r>
-              <a:rPr lang="pt-BR" smtClean="0"/>
+              <a:rPr lang="pt-BR"/>
               <a:t>Clique para editar o estilo do subtítulo mestre</a:t>
             </a:r>
-            <a:endParaRPr lang="pt-BR"/>
           </a:p>
         </p:txBody>
       </p:sp>
@@ -730,7 +1023,7 @@
           <a:p>
             <a:fld id="{080DFA31-8C8A-4704-967F-6616FC98D181}" type="datetimeFigureOut">
               <a:rPr lang="pt-BR" smtClean="0"/>
-              <a:t>26/02/2021</a:t>
+              <a:t>30/03/2021</a:t>
             </a:fld>
             <a:endParaRPr lang="pt-BR"/>
           </a:p>
@@ -824,10 +1117,9 @@
           <a:lstStyle/>
           <a:p>
             <a:r>
-              <a:rPr lang="pt-BR" smtClean="0"/>
+              <a:rPr lang="pt-BR"/>
               <a:t>Clique para editar o título mestre</a:t>
             </a:r>
-            <a:endParaRPr lang="pt-BR"/>
           </a:p>
         </p:txBody>
       </p:sp>
@@ -848,38 +1140,37 @@
           <a:p>
             <a:pPr lvl="0"/>
             <a:r>
-              <a:rPr lang="pt-BR" smtClean="0"/>
+              <a:rPr lang="pt-BR"/>
               <a:t>Clique para editar o texto mestre</a:t>
             </a:r>
           </a:p>
           <a:p>
             <a:pPr lvl="1"/>
             <a:r>
-              <a:rPr lang="pt-BR" smtClean="0"/>
+              <a:rPr lang="pt-BR"/>
               <a:t>Segundo nível</a:t>
             </a:r>
           </a:p>
           <a:p>
             <a:pPr lvl="2"/>
             <a:r>
-              <a:rPr lang="pt-BR" smtClean="0"/>
+              <a:rPr lang="pt-BR"/>
               <a:t>Terceiro nível</a:t>
             </a:r>
           </a:p>
           <a:p>
             <a:pPr lvl="3"/>
             <a:r>
-              <a:rPr lang="pt-BR" smtClean="0"/>
+              <a:rPr lang="pt-BR"/>
               <a:t>Quarto nível</a:t>
             </a:r>
           </a:p>
           <a:p>
             <a:pPr lvl="4"/>
             <a:r>
-              <a:rPr lang="pt-BR" smtClean="0"/>
+              <a:rPr lang="pt-BR"/>
               <a:t>Quinto nível</a:t>
             </a:r>
-            <a:endParaRPr lang="pt-BR"/>
           </a:p>
         </p:txBody>
       </p:sp>
@@ -900,7 +1191,7 @@
           <a:p>
             <a:fld id="{080DFA31-8C8A-4704-967F-6616FC98D181}" type="datetimeFigureOut">
               <a:rPr lang="pt-BR" smtClean="0"/>
-              <a:t>26/02/2021</a:t>
+              <a:t>30/03/2021</a:t>
             </a:fld>
             <a:endParaRPr lang="pt-BR"/>
           </a:p>
@@ -999,10 +1290,9 @@
           <a:lstStyle/>
           <a:p>
             <a:r>
-              <a:rPr lang="pt-BR" smtClean="0"/>
+              <a:rPr lang="pt-BR"/>
               <a:t>Clique para editar o título mestre</a:t>
             </a:r>
-            <a:endParaRPr lang="pt-BR"/>
           </a:p>
         </p:txBody>
       </p:sp>
@@ -1028,38 +1318,37 @@
           <a:p>
             <a:pPr lvl="0"/>
             <a:r>
-              <a:rPr lang="pt-BR" smtClean="0"/>
+              <a:rPr lang="pt-BR"/>
               <a:t>Clique para editar o texto mestre</a:t>
             </a:r>
           </a:p>
           <a:p>
             <a:pPr lvl="1"/>
             <a:r>
-              <a:rPr lang="pt-BR" smtClean="0"/>
+              <a:rPr lang="pt-BR"/>
               <a:t>Segundo nível</a:t>
             </a:r>
           </a:p>
           <a:p>
             <a:pPr lvl="2"/>
             <a:r>
-              <a:rPr lang="pt-BR" smtClean="0"/>
+              <a:rPr lang="pt-BR"/>
               <a:t>Terceiro nível</a:t>
             </a:r>
           </a:p>
           <a:p>
             <a:pPr lvl="3"/>
             <a:r>
-              <a:rPr lang="pt-BR" smtClean="0"/>
+              <a:rPr lang="pt-BR"/>
               <a:t>Quarto nível</a:t>
             </a:r>
           </a:p>
           <a:p>
             <a:pPr lvl="4"/>
             <a:r>
-              <a:rPr lang="pt-BR" smtClean="0"/>
+              <a:rPr lang="pt-BR"/>
               <a:t>Quinto nível</a:t>
             </a:r>
-            <a:endParaRPr lang="pt-BR"/>
           </a:p>
         </p:txBody>
       </p:sp>
@@ -1080,7 +1369,7 @@
           <a:p>
             <a:fld id="{080DFA31-8C8A-4704-967F-6616FC98D181}" type="datetimeFigureOut">
               <a:rPr lang="pt-BR" smtClean="0"/>
-              <a:t>26/02/2021</a:t>
+              <a:t>30/03/2021</a:t>
             </a:fld>
             <a:endParaRPr lang="pt-BR"/>
           </a:p>
@@ -1174,10 +1463,9 @@
           <a:lstStyle/>
           <a:p>
             <a:r>
-              <a:rPr lang="pt-BR" smtClean="0"/>
+              <a:rPr lang="pt-BR"/>
               <a:t>Clique para editar o título mestre</a:t>
             </a:r>
-            <a:endParaRPr lang="pt-BR"/>
           </a:p>
         </p:txBody>
       </p:sp>
@@ -1198,38 +1486,37 @@
           <a:p>
             <a:pPr lvl="0"/>
             <a:r>
-              <a:rPr lang="pt-BR" smtClean="0"/>
+              <a:rPr lang="pt-BR"/>
               <a:t>Clique para editar o texto mestre</a:t>
             </a:r>
           </a:p>
           <a:p>
             <a:pPr lvl="1"/>
             <a:r>
-              <a:rPr lang="pt-BR" smtClean="0"/>
+              <a:rPr lang="pt-BR"/>
               <a:t>Segundo nível</a:t>
             </a:r>
           </a:p>
           <a:p>
             <a:pPr lvl="2"/>
             <a:r>
-              <a:rPr lang="pt-BR" smtClean="0"/>
+              <a:rPr lang="pt-BR"/>
               <a:t>Terceiro nível</a:t>
             </a:r>
           </a:p>
           <a:p>
             <a:pPr lvl="3"/>
             <a:r>
-              <a:rPr lang="pt-BR" smtClean="0"/>
+              <a:rPr lang="pt-BR"/>
               <a:t>Quarto nível</a:t>
             </a:r>
           </a:p>
           <a:p>
             <a:pPr lvl="4"/>
             <a:r>
-              <a:rPr lang="pt-BR" smtClean="0"/>
+              <a:rPr lang="pt-BR"/>
               <a:t>Quinto nível</a:t>
             </a:r>
-            <a:endParaRPr lang="pt-BR"/>
           </a:p>
         </p:txBody>
       </p:sp>
@@ -1250,7 +1537,7 @@
           <a:p>
             <a:fld id="{080DFA31-8C8A-4704-967F-6616FC98D181}" type="datetimeFigureOut">
               <a:rPr lang="pt-BR" smtClean="0"/>
-              <a:t>26/02/2021</a:t>
+              <a:t>30/03/2021</a:t>
             </a:fld>
             <a:endParaRPr lang="pt-BR"/>
           </a:p>
@@ -1353,10 +1640,9 @@
           </a:lstStyle>
           <a:p>
             <a:r>
-              <a:rPr lang="pt-BR" smtClean="0"/>
+              <a:rPr lang="pt-BR"/>
               <a:t>Clique para editar o título mestre</a:t>
             </a:r>
-            <a:endParaRPr lang="pt-BR"/>
           </a:p>
         </p:txBody>
       </p:sp>
@@ -1473,7 +1759,7 @@
           <a:p>
             <a:pPr lvl="0"/>
             <a:r>
-              <a:rPr lang="pt-BR" smtClean="0"/>
+              <a:rPr lang="pt-BR"/>
               <a:t>Clique para editar o texto mestre</a:t>
             </a:r>
           </a:p>
@@ -1496,7 +1782,7 @@
           <a:p>
             <a:fld id="{080DFA31-8C8A-4704-967F-6616FC98D181}" type="datetimeFigureOut">
               <a:rPr lang="pt-BR" smtClean="0"/>
-              <a:t>26/02/2021</a:t>
+              <a:t>30/03/2021</a:t>
             </a:fld>
             <a:endParaRPr lang="pt-BR"/>
           </a:p>
@@ -1590,10 +1876,9 @@
           <a:lstStyle/>
           <a:p>
             <a:r>
-              <a:rPr lang="pt-BR" smtClean="0"/>
+              <a:rPr lang="pt-BR"/>
               <a:t>Clique para editar o título mestre</a:t>
             </a:r>
-            <a:endParaRPr lang="pt-BR"/>
           </a:p>
         </p:txBody>
       </p:sp>
@@ -1647,38 +1932,37 @@
           <a:p>
             <a:pPr lvl="0"/>
             <a:r>
-              <a:rPr lang="pt-BR" smtClean="0"/>
+              <a:rPr lang="pt-BR"/>
               <a:t>Clique para editar o texto mestre</a:t>
             </a:r>
           </a:p>
           <a:p>
             <a:pPr lvl="1"/>
             <a:r>
-              <a:rPr lang="pt-BR" smtClean="0"/>
+              <a:rPr lang="pt-BR"/>
               <a:t>Segundo nível</a:t>
             </a:r>
           </a:p>
           <a:p>
             <a:pPr lvl="2"/>
             <a:r>
-              <a:rPr lang="pt-BR" smtClean="0"/>
+              <a:rPr lang="pt-BR"/>
               <a:t>Terceiro nível</a:t>
             </a:r>
           </a:p>
           <a:p>
             <a:pPr lvl="3"/>
             <a:r>
-              <a:rPr lang="pt-BR" smtClean="0"/>
+              <a:rPr lang="pt-BR"/>
               <a:t>Quarto nível</a:t>
             </a:r>
           </a:p>
           <a:p>
             <a:pPr lvl="4"/>
             <a:r>
-              <a:rPr lang="pt-BR" smtClean="0"/>
+              <a:rPr lang="pt-BR"/>
               <a:t>Quinto nível</a:t>
             </a:r>
-            <a:endParaRPr lang="pt-BR"/>
           </a:p>
         </p:txBody>
       </p:sp>
@@ -1732,38 +2016,37 @@
           <a:p>
             <a:pPr lvl="0"/>
             <a:r>
-              <a:rPr lang="pt-BR" smtClean="0"/>
+              <a:rPr lang="pt-BR"/>
               <a:t>Clique para editar o texto mestre</a:t>
             </a:r>
           </a:p>
           <a:p>
             <a:pPr lvl="1"/>
             <a:r>
-              <a:rPr lang="pt-BR" smtClean="0"/>
+              <a:rPr lang="pt-BR"/>
               <a:t>Segundo nível</a:t>
             </a:r>
           </a:p>
           <a:p>
             <a:pPr lvl="2"/>
             <a:r>
-              <a:rPr lang="pt-BR" smtClean="0"/>
+              <a:rPr lang="pt-BR"/>
               <a:t>Terceiro nível</a:t>
             </a:r>
           </a:p>
           <a:p>
             <a:pPr lvl="3"/>
             <a:r>
-              <a:rPr lang="pt-BR" smtClean="0"/>
+              <a:rPr lang="pt-BR"/>
               <a:t>Quarto nível</a:t>
             </a:r>
           </a:p>
           <a:p>
             <a:pPr lvl="4"/>
             <a:r>
-              <a:rPr lang="pt-BR" smtClean="0"/>
+              <a:rPr lang="pt-BR"/>
               <a:t>Quinto nível</a:t>
             </a:r>
-            <a:endParaRPr lang="pt-BR"/>
           </a:p>
         </p:txBody>
       </p:sp>
@@ -1784,7 +2067,7 @@
           <a:p>
             <a:fld id="{080DFA31-8C8A-4704-967F-6616FC98D181}" type="datetimeFigureOut">
               <a:rPr lang="pt-BR" smtClean="0"/>
-              <a:t>26/02/2021</a:t>
+              <a:t>30/03/2021</a:t>
             </a:fld>
             <a:endParaRPr lang="pt-BR"/>
           </a:p>
@@ -1882,10 +2165,9 @@
           </a:lstStyle>
           <a:p>
             <a:r>
-              <a:rPr lang="pt-BR" smtClean="0"/>
+              <a:rPr lang="pt-BR"/>
               <a:t>Clique para editar o título mestre</a:t>
             </a:r>
-            <a:endParaRPr lang="pt-BR"/>
           </a:p>
         </p:txBody>
       </p:sp>
@@ -1948,7 +2230,7 @@
           <a:p>
             <a:pPr lvl="0"/>
             <a:r>
-              <a:rPr lang="pt-BR" smtClean="0"/>
+              <a:rPr lang="pt-BR"/>
               <a:t>Clique para editar o texto mestre</a:t>
             </a:r>
           </a:p>
@@ -2004,38 +2286,37 @@
           <a:p>
             <a:pPr lvl="0"/>
             <a:r>
-              <a:rPr lang="pt-BR" smtClean="0"/>
+              <a:rPr lang="pt-BR"/>
               <a:t>Clique para editar o texto mestre</a:t>
             </a:r>
           </a:p>
           <a:p>
             <a:pPr lvl="1"/>
             <a:r>
-              <a:rPr lang="pt-BR" smtClean="0"/>
+              <a:rPr lang="pt-BR"/>
               <a:t>Segundo nível</a:t>
             </a:r>
           </a:p>
           <a:p>
             <a:pPr lvl="2"/>
             <a:r>
-              <a:rPr lang="pt-BR" smtClean="0"/>
+              <a:rPr lang="pt-BR"/>
               <a:t>Terceiro nível</a:t>
             </a:r>
           </a:p>
           <a:p>
             <a:pPr lvl="3"/>
             <a:r>
-              <a:rPr lang="pt-BR" smtClean="0"/>
+              <a:rPr lang="pt-BR"/>
               <a:t>Quarto nível</a:t>
             </a:r>
           </a:p>
           <a:p>
             <a:pPr lvl="4"/>
             <a:r>
-              <a:rPr lang="pt-BR" smtClean="0"/>
+              <a:rPr lang="pt-BR"/>
               <a:t>Quinto nível</a:t>
             </a:r>
-            <a:endParaRPr lang="pt-BR"/>
           </a:p>
         </p:txBody>
       </p:sp>
@@ -2098,7 +2379,7 @@
           <a:p>
             <a:pPr lvl="0"/>
             <a:r>
-              <a:rPr lang="pt-BR" smtClean="0"/>
+              <a:rPr lang="pt-BR"/>
               <a:t>Clique para editar o texto mestre</a:t>
             </a:r>
           </a:p>
@@ -2154,38 +2435,37 @@
           <a:p>
             <a:pPr lvl="0"/>
             <a:r>
-              <a:rPr lang="pt-BR" smtClean="0"/>
+              <a:rPr lang="pt-BR"/>
               <a:t>Clique para editar o texto mestre</a:t>
             </a:r>
           </a:p>
           <a:p>
             <a:pPr lvl="1"/>
             <a:r>
-              <a:rPr lang="pt-BR" smtClean="0"/>
+              <a:rPr lang="pt-BR"/>
               <a:t>Segundo nível</a:t>
             </a:r>
           </a:p>
           <a:p>
             <a:pPr lvl="2"/>
             <a:r>
-              <a:rPr lang="pt-BR" smtClean="0"/>
+              <a:rPr lang="pt-BR"/>
               <a:t>Terceiro nível</a:t>
             </a:r>
           </a:p>
           <a:p>
             <a:pPr lvl="3"/>
             <a:r>
-              <a:rPr lang="pt-BR" smtClean="0"/>
+              <a:rPr lang="pt-BR"/>
               <a:t>Quarto nível</a:t>
             </a:r>
           </a:p>
           <a:p>
             <a:pPr lvl="4"/>
             <a:r>
-              <a:rPr lang="pt-BR" smtClean="0"/>
+              <a:rPr lang="pt-BR"/>
               <a:t>Quinto nível</a:t>
             </a:r>
-            <a:endParaRPr lang="pt-BR"/>
           </a:p>
         </p:txBody>
       </p:sp>
@@ -2206,7 +2486,7 @@
           <a:p>
             <a:fld id="{080DFA31-8C8A-4704-967F-6616FC98D181}" type="datetimeFigureOut">
               <a:rPr lang="pt-BR" smtClean="0"/>
-              <a:t>26/02/2021</a:t>
+              <a:t>30/03/2021</a:t>
             </a:fld>
             <a:endParaRPr lang="pt-BR"/>
           </a:p>
@@ -2300,10 +2580,9 @@
           <a:lstStyle/>
           <a:p>
             <a:r>
-              <a:rPr lang="pt-BR" smtClean="0"/>
+              <a:rPr lang="pt-BR"/>
               <a:t>Clique para editar o título mestre</a:t>
             </a:r>
-            <a:endParaRPr lang="pt-BR"/>
           </a:p>
         </p:txBody>
       </p:sp>
@@ -2324,7 +2603,7 @@
           <a:p>
             <a:fld id="{080DFA31-8C8A-4704-967F-6616FC98D181}" type="datetimeFigureOut">
               <a:rPr lang="pt-BR" smtClean="0"/>
-              <a:t>26/02/2021</a:t>
+              <a:t>30/03/2021</a:t>
             </a:fld>
             <a:endParaRPr lang="pt-BR"/>
           </a:p>
@@ -2419,7 +2698,7 @@
           <a:p>
             <a:fld id="{080DFA31-8C8A-4704-967F-6616FC98D181}" type="datetimeFigureOut">
               <a:rPr lang="pt-BR" smtClean="0"/>
-              <a:t>26/02/2021</a:t>
+              <a:t>30/03/2021</a:t>
             </a:fld>
             <a:endParaRPr lang="pt-BR"/>
           </a:p>
@@ -2522,10 +2801,9 @@
           </a:lstStyle>
           <a:p>
             <a:r>
-              <a:rPr lang="pt-BR" smtClean="0"/>
+              <a:rPr lang="pt-BR"/>
               <a:t>Clique para editar o título mestre</a:t>
             </a:r>
-            <a:endParaRPr lang="pt-BR"/>
           </a:p>
         </p:txBody>
       </p:sp>
@@ -2579,38 +2857,37 @@
           <a:p>
             <a:pPr lvl="0"/>
             <a:r>
-              <a:rPr lang="pt-BR" smtClean="0"/>
+              <a:rPr lang="pt-BR"/>
               <a:t>Clique para editar o texto mestre</a:t>
             </a:r>
           </a:p>
           <a:p>
             <a:pPr lvl="1"/>
             <a:r>
-              <a:rPr lang="pt-BR" smtClean="0"/>
+              <a:rPr lang="pt-BR"/>
               <a:t>Segundo nível</a:t>
             </a:r>
           </a:p>
           <a:p>
             <a:pPr lvl="2"/>
             <a:r>
-              <a:rPr lang="pt-BR" smtClean="0"/>
+              <a:rPr lang="pt-BR"/>
               <a:t>Terceiro nível</a:t>
             </a:r>
           </a:p>
           <a:p>
             <a:pPr lvl="3"/>
             <a:r>
-              <a:rPr lang="pt-BR" smtClean="0"/>
+              <a:rPr lang="pt-BR"/>
               <a:t>Quarto nível</a:t>
             </a:r>
           </a:p>
           <a:p>
             <a:pPr lvl="4"/>
             <a:r>
-              <a:rPr lang="pt-BR" smtClean="0"/>
+              <a:rPr lang="pt-BR"/>
               <a:t>Quinto nível</a:t>
             </a:r>
-            <a:endParaRPr lang="pt-BR"/>
           </a:p>
         </p:txBody>
       </p:sp>
@@ -2673,7 +2950,7 @@
           <a:p>
             <a:pPr lvl="0"/>
             <a:r>
-              <a:rPr lang="pt-BR" smtClean="0"/>
+              <a:rPr lang="pt-BR"/>
               <a:t>Clique para editar o texto mestre</a:t>
             </a:r>
           </a:p>
@@ -2696,7 +2973,7 @@
           <a:p>
             <a:fld id="{080DFA31-8C8A-4704-967F-6616FC98D181}" type="datetimeFigureOut">
               <a:rPr lang="pt-BR" smtClean="0"/>
-              <a:t>26/02/2021</a:t>
+              <a:t>30/03/2021</a:t>
             </a:fld>
             <a:endParaRPr lang="pt-BR"/>
           </a:p>
@@ -2799,10 +3076,9 @@
           </a:lstStyle>
           <a:p>
             <a:r>
-              <a:rPr lang="pt-BR" smtClean="0"/>
+              <a:rPr lang="pt-BR"/>
               <a:t>Clique para editar o título mestre</a:t>
             </a:r>
-            <a:endParaRPr lang="pt-BR"/>
           </a:p>
         </p:txBody>
       </p:sp>
@@ -2926,7 +3202,7 @@
           <a:p>
             <a:pPr lvl="0"/>
             <a:r>
-              <a:rPr lang="pt-BR" smtClean="0"/>
+              <a:rPr lang="pt-BR"/>
               <a:t>Clique para editar o texto mestre</a:t>
             </a:r>
           </a:p>
@@ -2949,7 +3225,7 @@
           <a:p>
             <a:fld id="{080DFA31-8C8A-4704-967F-6616FC98D181}" type="datetimeFigureOut">
               <a:rPr lang="pt-BR" smtClean="0"/>
-              <a:t>26/02/2021</a:t>
+              <a:t>30/03/2021</a:t>
             </a:fld>
             <a:endParaRPr lang="pt-BR"/>
           </a:p>
@@ -3058,10 +3334,9 @@
           <a:lstStyle/>
           <a:p>
             <a:r>
-              <a:rPr lang="pt-BR" smtClean="0"/>
+              <a:rPr lang="pt-BR"/>
               <a:t>Clique para editar o título mestre</a:t>
             </a:r>
-            <a:endParaRPr lang="pt-BR"/>
           </a:p>
         </p:txBody>
       </p:sp>
@@ -3092,38 +3367,37 @@
           <a:p>
             <a:pPr lvl="0"/>
             <a:r>
-              <a:rPr lang="pt-BR" smtClean="0"/>
+              <a:rPr lang="pt-BR"/>
               <a:t>Clique para editar o texto mestre</a:t>
             </a:r>
           </a:p>
           <a:p>
             <a:pPr lvl="1"/>
             <a:r>
-              <a:rPr lang="pt-BR" smtClean="0"/>
+              <a:rPr lang="pt-BR"/>
               <a:t>Segundo nível</a:t>
             </a:r>
           </a:p>
           <a:p>
             <a:pPr lvl="2"/>
             <a:r>
-              <a:rPr lang="pt-BR" smtClean="0"/>
+              <a:rPr lang="pt-BR"/>
               <a:t>Terceiro nível</a:t>
             </a:r>
           </a:p>
           <a:p>
             <a:pPr lvl="3"/>
             <a:r>
-              <a:rPr lang="pt-BR" smtClean="0"/>
+              <a:rPr lang="pt-BR"/>
               <a:t>Quarto nível</a:t>
             </a:r>
           </a:p>
           <a:p>
             <a:pPr lvl="4"/>
             <a:r>
-              <a:rPr lang="pt-BR" smtClean="0"/>
+              <a:rPr lang="pt-BR"/>
               <a:t>Quinto nível</a:t>
             </a:r>
-            <a:endParaRPr lang="pt-BR"/>
           </a:p>
         </p:txBody>
       </p:sp>
@@ -3162,7 +3436,7 @@
           <a:p>
             <a:fld id="{080DFA31-8C8A-4704-967F-6616FC98D181}" type="datetimeFigureOut">
               <a:rPr lang="pt-BR" smtClean="0"/>
-              <a:t>26/02/2021</a:t>
+              <a:t>30/03/2021</a:t>
             </a:fld>
             <a:endParaRPr lang="pt-BR"/>
           </a:p>
@@ -3572,7 +3846,13 @@
       </p:sp>
       <p:pic>
         <p:nvPicPr>
-          <p:cNvPr id="2" name="Imagem 1"/>
+          <p:cNvPr id="4" name="Imagem 3" descr="Interface gráfica do usuário, Texto, Aplicativo, Email&#10;&#10;Descrição gerada automaticamente">
+            <a:extLst>
+              <a:ext uri="{FF2B5EF4-FFF2-40B4-BE49-F238E27FC236}">
+                <a16:creationId xmlns:a16="http://schemas.microsoft.com/office/drawing/2014/main" id="{366B3D47-BBF0-4D29-A8BE-33A00EA622B6}"/>
+              </a:ext>
+            </a:extLst>
+          </p:cNvPr>
           <p:cNvPicPr>
             <a:picLocks noChangeAspect="1"/>
           </p:cNvPicPr>
@@ -3592,8 +3872,8 @@
         </p:blipFill>
         <p:spPr>
           <a:xfrm>
-            <a:off x="337694" y="2564904"/>
-            <a:ext cx="8468612" cy="1954295"/>
+            <a:off x="611560" y="2564904"/>
+            <a:ext cx="8136904" cy="2159862"/>
           </a:xfrm>
           <a:prstGeom prst="rect">
             <a:avLst/>
@@ -3630,9 +3910,48 @@
           <a:chExt cx="0" cy="0"/>
         </a:xfrm>
       </p:grpSpPr>
+      <p:sp>
+        <p:nvSpPr>
+          <p:cNvPr id="4" name="CaixaDeTexto 3"/>
+          <p:cNvSpPr txBox="1"/>
+          <p:nvPr/>
+        </p:nvSpPr>
+        <p:spPr>
+          <a:xfrm>
+            <a:off x="0" y="836712"/>
+            <a:ext cx="9144000" cy="461665"/>
+          </a:xfrm>
+          <a:prstGeom prst="rect">
+            <a:avLst/>
+          </a:prstGeom>
+          <a:noFill/>
+        </p:spPr>
+        <p:txBody>
+          <a:bodyPr wrap="square" rtlCol="0">
+            <a:spAutoFit/>
+          </a:bodyPr>
+          <a:lstStyle/>
+          <a:p>
+            <a:pPr algn="ctr"/>
+            <a:r>
+              <a:rPr lang="pt-BR" sz="2400" b="1" dirty="0">
+                <a:latin typeface="Arial" pitchFamily="34" charset="0"/>
+                <a:cs typeface="Arial" pitchFamily="34" charset="0"/>
+              </a:rPr>
+              <a:t>Cenário: Fazer Inscrição</a:t>
+            </a:r>
+          </a:p>
+        </p:txBody>
+      </p:sp>
       <p:pic>
         <p:nvPicPr>
-          <p:cNvPr id="3" name="Imagem 2"/>
+          <p:cNvPr id="7" name="Imagem 6" descr="Uma imagem contendo Interface gráfica do usuário&#10;&#10;Descrição gerada automaticamente">
+            <a:extLst>
+              <a:ext uri="{FF2B5EF4-FFF2-40B4-BE49-F238E27FC236}">
+                <a16:creationId xmlns:a16="http://schemas.microsoft.com/office/drawing/2014/main" id="{C49313D5-A1B3-4501-BC6F-616438DEAE7B}"/>
+              </a:ext>
+            </a:extLst>
+          </p:cNvPr>
           <p:cNvPicPr>
             <a:picLocks noChangeAspect="1"/>
           </p:cNvPicPr>
@@ -3652,47 +3971,14 @@
         </p:blipFill>
         <p:spPr>
           <a:xfrm>
-            <a:off x="251520" y="2060848"/>
-            <a:ext cx="8603066" cy="2756322"/>
+            <a:off x="593812" y="2348880"/>
+            <a:ext cx="7956376" cy="2691443"/>
           </a:xfrm>
           <a:prstGeom prst="rect">
             <a:avLst/>
           </a:prstGeom>
         </p:spPr>
       </p:pic>
-      <p:sp>
-        <p:nvSpPr>
-          <p:cNvPr id="4" name="CaixaDeTexto 3"/>
-          <p:cNvSpPr txBox="1"/>
-          <p:nvPr/>
-        </p:nvSpPr>
-        <p:spPr>
-          <a:xfrm>
-            <a:off x="0" y="836712"/>
-            <a:ext cx="9144000" cy="461665"/>
-          </a:xfrm>
-          <a:prstGeom prst="rect">
-            <a:avLst/>
-          </a:prstGeom>
-          <a:noFill/>
-        </p:spPr>
-        <p:txBody>
-          <a:bodyPr wrap="square" rtlCol="0">
-            <a:spAutoFit/>
-          </a:bodyPr>
-          <a:lstStyle/>
-          <a:p>
-            <a:pPr algn="ctr"/>
-            <a:r>
-              <a:rPr lang="pt-BR" sz="2400" b="1" dirty="0">
-                <a:latin typeface="Arial" pitchFamily="34" charset="0"/>
-                <a:cs typeface="Arial" pitchFamily="34" charset="0"/>
-              </a:rPr>
-              <a:t>Cenário: Fazer Matrícula</a:t>
-            </a:r>
-          </a:p>
-        </p:txBody>
-      </p:sp>
     </p:spTree>
     <p:extLst>
       <p:ext uri="{BB962C8B-B14F-4D97-AF65-F5344CB8AC3E}">
@@ -3751,31 +4037,26 @@
                 <a:latin typeface="Arial" pitchFamily="34" charset="0"/>
                 <a:cs typeface="Arial" pitchFamily="34" charset="0"/>
               </a:rPr>
-              <a:t>Cenário: </a:t>
-            </a:r>
-            <a:r>
-              <a:rPr lang="pt-BR" sz="2400" b="1" dirty="0" smtClean="0">
-                <a:latin typeface="Arial" pitchFamily="34" charset="0"/>
-                <a:cs typeface="Arial" pitchFamily="34" charset="0"/>
-              </a:rPr>
-              <a:t>Visualizar frequência</a:t>
-            </a:r>
-            <a:endParaRPr lang="pt-BR" sz="2400" b="1" dirty="0">
-              <a:latin typeface="Arial" pitchFamily="34" charset="0"/>
-              <a:cs typeface="Arial" pitchFamily="34" charset="0"/>
-            </a:endParaRPr>
+              <a:t>Cenário: Realizar Provas</a:t>
+            </a:r>
           </a:p>
         </p:txBody>
       </p:sp>
       <p:pic>
         <p:nvPicPr>
-          <p:cNvPr id="4" name="Imagem 3"/>
+          <p:cNvPr id="13" name="Imagem 12" descr="Diagrama&#10;&#10;Descrição gerada automaticamente">
+            <a:extLst>
+              <a:ext uri="{FF2B5EF4-FFF2-40B4-BE49-F238E27FC236}">
+                <a16:creationId xmlns:a16="http://schemas.microsoft.com/office/drawing/2014/main" id="{384C644D-0FA7-4F0E-957A-B72E1345C62C}"/>
+              </a:ext>
+            </a:extLst>
+          </p:cNvPr>
           <p:cNvPicPr>
             <a:picLocks noChangeAspect="1"/>
           </p:cNvPicPr>
           <p:nvPr/>
         </p:nvPicPr>
-        <p:blipFill>
+        <p:blipFill rotWithShape="1">
           <a:blip r:embed="rId2">
             <a:extLst>
               <a:ext uri="{28A0092B-C50C-407E-A947-70E740481C1C}">
@@ -3783,14 +4064,13 @@
               </a:ext>
             </a:extLst>
           </a:blip>
-          <a:stretch>
-            <a:fillRect/>
-          </a:stretch>
+          <a:srcRect l="858" r="12473" b="22683"/>
+          <a:stretch/>
         </p:blipFill>
         <p:spPr>
           <a:xfrm>
-            <a:off x="251520" y="2132856"/>
-            <a:ext cx="8712968" cy="2791533"/>
+            <a:off x="1043608" y="2492896"/>
+            <a:ext cx="7676853" cy="2736304"/>
           </a:xfrm>
           <a:prstGeom prst="rect">
             <a:avLst/>
@@ -3855,31 +4135,26 @@
                 <a:latin typeface="Arial" pitchFamily="34" charset="0"/>
                 <a:cs typeface="Arial" pitchFamily="34" charset="0"/>
               </a:rPr>
-              <a:t>Cenário: </a:t>
-            </a:r>
-            <a:r>
-              <a:rPr lang="pt-BR" sz="2400" b="1" dirty="0" smtClean="0">
-                <a:latin typeface="Arial" pitchFamily="34" charset="0"/>
-                <a:cs typeface="Arial" pitchFamily="34" charset="0"/>
-              </a:rPr>
-              <a:t>Consultar notas</a:t>
-            </a:r>
-            <a:endParaRPr lang="pt-BR" sz="2400" b="1" dirty="0">
-              <a:latin typeface="Arial" pitchFamily="34" charset="0"/>
-              <a:cs typeface="Arial" pitchFamily="34" charset="0"/>
-            </a:endParaRPr>
+              <a:t>Cenário: Visualizar Resultado das Provas</a:t>
+            </a:r>
           </a:p>
         </p:txBody>
       </p:sp>
       <p:pic>
         <p:nvPicPr>
-          <p:cNvPr id="4" name="Imagem 3"/>
+          <p:cNvPr id="5" name="Imagem 4" descr="Diagrama&#10;&#10;Descrição gerada automaticamente">
+            <a:extLst>
+              <a:ext uri="{FF2B5EF4-FFF2-40B4-BE49-F238E27FC236}">
+                <a16:creationId xmlns:a16="http://schemas.microsoft.com/office/drawing/2014/main" id="{67AAD100-0D84-4C72-A1BE-2594F7A257E0}"/>
+              </a:ext>
+            </a:extLst>
+          </p:cNvPr>
           <p:cNvPicPr>
             <a:picLocks noChangeAspect="1"/>
           </p:cNvPicPr>
           <p:nvPr/>
         </p:nvPicPr>
-        <p:blipFill>
+        <p:blipFill rotWithShape="1">
           <a:blip r:embed="rId2">
             <a:extLst>
               <a:ext uri="{28A0092B-C50C-407E-A947-70E740481C1C}">
@@ -3887,14 +4162,13 @@
               </a:ext>
             </a:extLst>
           </a:blip>
-          <a:stretch>
-            <a:fillRect/>
-          </a:stretch>
+          <a:srcRect r="17095"/>
+          <a:stretch/>
         </p:blipFill>
         <p:spPr>
           <a:xfrm>
-            <a:off x="169717" y="2252092"/>
-            <a:ext cx="8804566" cy="2833092"/>
+            <a:off x="755576" y="2564904"/>
+            <a:ext cx="7854524" cy="3096344"/>
           </a:xfrm>
           <a:prstGeom prst="rect">
             <a:avLst/>
@@ -3931,9 +4205,48 @@
           <a:chExt cx="0" cy="0"/>
         </a:xfrm>
       </p:grpSpPr>
+      <p:sp>
+        <p:nvSpPr>
+          <p:cNvPr id="3" name="CaixaDeTexto 2"/>
+          <p:cNvSpPr txBox="1"/>
+          <p:nvPr/>
+        </p:nvSpPr>
+        <p:spPr>
+          <a:xfrm>
+            <a:off x="0" y="836712"/>
+            <a:ext cx="9144000" cy="461665"/>
+          </a:xfrm>
+          <a:prstGeom prst="rect">
+            <a:avLst/>
+          </a:prstGeom>
+          <a:noFill/>
+        </p:spPr>
+        <p:txBody>
+          <a:bodyPr wrap="square" rtlCol="0">
+            <a:spAutoFit/>
+          </a:bodyPr>
+          <a:lstStyle/>
+          <a:p>
+            <a:pPr algn="ctr"/>
+            <a:r>
+              <a:rPr lang="pt-BR" sz="2400" b="1" dirty="0">
+                <a:latin typeface="Arial" pitchFamily="34" charset="0"/>
+                <a:cs typeface="Arial" pitchFamily="34" charset="0"/>
+              </a:rPr>
+              <a:t>Cenário: Entregar Documentação</a:t>
+            </a:r>
+          </a:p>
+        </p:txBody>
+      </p:sp>
       <p:pic>
         <p:nvPicPr>
-          <p:cNvPr id="2" name="Imagem 1"/>
+          <p:cNvPr id="5" name="Imagem 4" descr="Forma&#10;&#10;Descrição gerada automaticamente">
+            <a:extLst>
+              <a:ext uri="{FF2B5EF4-FFF2-40B4-BE49-F238E27FC236}">
+                <a16:creationId xmlns:a16="http://schemas.microsoft.com/office/drawing/2014/main" id="{DE0BE3FA-D448-4B30-828F-4FCEFEE94C33}"/>
+              </a:ext>
+            </a:extLst>
+          </p:cNvPr>
           <p:cNvPicPr>
             <a:picLocks noChangeAspect="1"/>
           </p:cNvPicPr>
@@ -3953,47 +4266,14 @@
         </p:blipFill>
         <p:spPr>
           <a:xfrm>
-            <a:off x="244383" y="2060848"/>
-            <a:ext cx="8648097" cy="2770749"/>
+            <a:off x="575556" y="2492896"/>
+            <a:ext cx="7992888" cy="2707442"/>
           </a:xfrm>
           <a:prstGeom prst="rect">
             <a:avLst/>
           </a:prstGeom>
         </p:spPr>
       </p:pic>
-      <p:sp>
-        <p:nvSpPr>
-          <p:cNvPr id="3" name="CaixaDeTexto 2"/>
-          <p:cNvSpPr txBox="1"/>
-          <p:nvPr/>
-        </p:nvSpPr>
-        <p:spPr>
-          <a:xfrm>
-            <a:off x="0" y="836712"/>
-            <a:ext cx="9144000" cy="461665"/>
-          </a:xfrm>
-          <a:prstGeom prst="rect">
-            <a:avLst/>
-          </a:prstGeom>
-          <a:noFill/>
-        </p:spPr>
-        <p:txBody>
-          <a:bodyPr wrap="square" rtlCol="0">
-            <a:spAutoFit/>
-          </a:bodyPr>
-          <a:lstStyle/>
-          <a:p>
-            <a:pPr algn="ctr"/>
-            <a:r>
-              <a:rPr lang="pt-BR" sz="2400" b="1" dirty="0">
-                <a:latin typeface="Arial" pitchFamily="34" charset="0"/>
-                <a:cs typeface="Arial" pitchFamily="34" charset="0"/>
-              </a:rPr>
-              <a:t>Cenário: Realizar Atividades</a:t>
-            </a:r>
-          </a:p>
-        </p:txBody>
-      </p:sp>
     </p:spTree>
     <p:extLst>
       <p:ext uri="{BB962C8B-B14F-4D97-AF65-F5344CB8AC3E}">
@@ -4024,9 +4304,48 @@
           <a:chExt cx="0" cy="0"/>
         </a:xfrm>
       </p:grpSpPr>
+      <p:sp>
+        <p:nvSpPr>
+          <p:cNvPr id="3" name="CaixaDeTexto 2"/>
+          <p:cNvSpPr txBox="1"/>
+          <p:nvPr/>
+        </p:nvSpPr>
+        <p:spPr>
+          <a:xfrm>
+            <a:off x="0" y="836712"/>
+            <a:ext cx="9144000" cy="461665"/>
+          </a:xfrm>
+          <a:prstGeom prst="rect">
+            <a:avLst/>
+          </a:prstGeom>
+          <a:noFill/>
+        </p:spPr>
+        <p:txBody>
+          <a:bodyPr wrap="square" rtlCol="0">
+            <a:spAutoFit/>
+          </a:bodyPr>
+          <a:lstStyle/>
+          <a:p>
+            <a:pPr algn="ctr"/>
+            <a:r>
+              <a:rPr lang="pt-BR" sz="2400" b="1" dirty="0">
+                <a:latin typeface="Arial" pitchFamily="34" charset="0"/>
+                <a:cs typeface="Arial" pitchFamily="34" charset="0"/>
+              </a:rPr>
+              <a:t>Cenário: Visualizar Resultado da Documentação</a:t>
+            </a:r>
+          </a:p>
+        </p:txBody>
+      </p:sp>
       <p:pic>
         <p:nvPicPr>
-          <p:cNvPr id="2" name="Imagem 1"/>
+          <p:cNvPr id="5" name="Imagem 4" descr="Forma&#10;&#10;Descrição gerada automaticamente com confiança média">
+            <a:extLst>
+              <a:ext uri="{FF2B5EF4-FFF2-40B4-BE49-F238E27FC236}">
+                <a16:creationId xmlns:a16="http://schemas.microsoft.com/office/drawing/2014/main" id="{08605365-73D4-49F2-8B29-13B48B533776}"/>
+              </a:ext>
+            </a:extLst>
+          </p:cNvPr>
           <p:cNvPicPr>
             <a:picLocks noChangeAspect="1"/>
           </p:cNvPicPr>
@@ -4046,14 +4365,44 @@
         </p:blipFill>
         <p:spPr>
           <a:xfrm>
-            <a:off x="217406" y="2060848"/>
-            <a:ext cx="8603066" cy="2756322"/>
+            <a:off x="683568" y="2636912"/>
+            <a:ext cx="7921501" cy="2693952"/>
           </a:xfrm>
           <a:prstGeom prst="rect">
             <a:avLst/>
           </a:prstGeom>
         </p:spPr>
       </p:pic>
+    </p:spTree>
+    <p:extLst>
+      <p:ext uri="{BB962C8B-B14F-4D97-AF65-F5344CB8AC3E}">
+        <p14:creationId xmlns:p14="http://schemas.microsoft.com/office/powerpoint/2010/main" val="1317682410"/>
+      </p:ext>
+    </p:extLst>
+  </p:cSld>
+  <p:clrMapOvr>
+    <a:masterClrMapping/>
+  </p:clrMapOvr>
+</p:sld>
+</file>
+
+<file path=ppt/slides/slide7.xml><?xml version="1.0" encoding="utf-8"?>
+<p:sld xmlns:a="http://schemas.openxmlformats.org/drawingml/2006/main" xmlns:r="http://schemas.openxmlformats.org/officeDocument/2006/relationships" xmlns:p="http://schemas.openxmlformats.org/presentationml/2006/main">
+  <p:cSld>
+    <p:spTree>
+      <p:nvGrpSpPr>
+        <p:cNvPr id="1" name=""/>
+        <p:cNvGrpSpPr/>
+        <p:nvPr/>
+      </p:nvGrpSpPr>
+      <p:grpSpPr>
+        <a:xfrm>
+          <a:off x="0" y="0"/>
+          <a:ext cx="0" cy="0"/>
+          <a:chOff x="0" y="0"/>
+          <a:chExt cx="0" cy="0"/>
+        </a:xfrm>
+      </p:grpSpPr>
       <p:sp>
         <p:nvSpPr>
           <p:cNvPr id="3" name="CaixaDeTexto 2"/>
@@ -4082,15 +4431,51 @@
                 <a:latin typeface="Arial" pitchFamily="34" charset="0"/>
                 <a:cs typeface="Arial" pitchFamily="34" charset="0"/>
               </a:rPr>
-              <a:t>Cenário: Estudar Conteúdo</a:t>
-            </a:r>
-          </a:p>
-        </p:txBody>
-      </p:sp>
+              <a:t>Cenário: Fazer Matrícula</a:t>
+            </a:r>
+          </a:p>
+        </p:txBody>
+      </p:sp>
+      <p:pic>
+        <p:nvPicPr>
+          <p:cNvPr id="7" name="Imagem 6" descr="Forma&#10;&#10;Descrição gerada automaticamente com confiança média">
+            <a:extLst>
+              <a:ext uri="{FF2B5EF4-FFF2-40B4-BE49-F238E27FC236}">
+                <a16:creationId xmlns:a16="http://schemas.microsoft.com/office/drawing/2014/main" id="{FF66E299-9BC2-40E3-852F-7A848AB656A7}"/>
+              </a:ext>
+            </a:extLst>
+          </p:cNvPr>
+          <p:cNvPicPr>
+            <a:picLocks noChangeAspect="1"/>
+          </p:cNvPicPr>
+          <p:nvPr/>
+        </p:nvPicPr>
+        <p:blipFill>
+          <a:blip r:embed="rId2">
+            <a:extLst>
+              <a:ext uri="{28A0092B-C50C-407E-A947-70E740481C1C}">
+                <a14:useLocalDpi xmlns:a14="http://schemas.microsoft.com/office/drawing/2010/main" val="0"/>
+              </a:ext>
+            </a:extLst>
+          </a:blip>
+          <a:stretch>
+            <a:fillRect/>
+          </a:stretch>
+        </p:blipFill>
+        <p:spPr>
+          <a:xfrm>
+            <a:off x="899592" y="2492896"/>
+            <a:ext cx="7834299" cy="2664296"/>
+          </a:xfrm>
+          <a:prstGeom prst="rect">
+            <a:avLst/>
+          </a:prstGeom>
+        </p:spPr>
+      </p:pic>
     </p:spTree>
     <p:extLst>
       <p:ext uri="{BB962C8B-B14F-4D97-AF65-F5344CB8AC3E}">
-        <p14:creationId xmlns:p14="http://schemas.microsoft.com/office/powerpoint/2010/main" val="1317682410"/>
+        <p14:creationId xmlns:p14="http://schemas.microsoft.com/office/powerpoint/2010/main" val="133914596"/>
       </p:ext>
     </p:extLst>
   </p:cSld>

</xml_diff>

<commit_message>
Artefatos 15 - 18
</commit_message>
<xml_diff>
--- a/Artefatos/15 - Arquitetura de Negócio para cada Cenário.pptx
+++ b/Artefatos/15 - Arquitetura de Negócio para cada Cenário.pptx
@@ -5,16 +5,13 @@
     <p:sldMasterId id="2147483648" r:id="rId1"/>
   </p:sldMasterIdLst>
   <p:notesMasterIdLst>
-    <p:notesMasterId r:id="rId9"/>
+    <p:notesMasterId r:id="rId6"/>
   </p:notesMasterIdLst>
   <p:sldIdLst>
     <p:sldId id="257" r:id="rId2"/>
     <p:sldId id="258" r:id="rId3"/>
-    <p:sldId id="259" r:id="rId4"/>
-    <p:sldId id="262" r:id="rId5"/>
-    <p:sldId id="260" r:id="rId6"/>
-    <p:sldId id="261" r:id="rId7"/>
-    <p:sldId id="263" r:id="rId8"/>
+    <p:sldId id="262" r:id="rId4"/>
+    <p:sldId id="263" r:id="rId5"/>
   </p:sldIdLst>
   <p:sldSz cx="9144000" cy="6858000" type="screen4x3"/>
   <p:notesSz cx="6858000" cy="9144000"/>
@@ -115,7 +112,7 @@
   </p:defaultTextStyle>
   <p:extLst>
     <p:ext uri="{EFAFB233-063F-42B5-8137-9DF3F51BA10A}">
-      <p15:sldGuideLst xmlns:p15="http://schemas.microsoft.com/office/powerpoint/2012/main">
+      <p15:sldGuideLst xmlns:p15="http://schemas.microsoft.com/office/powerpoint/2012/main" xmlns="">
         <p15:guide id="1" orient="horz" pos="2160">
           <p15:clr>
             <a:srgbClr val="A4A3A4"/>
@@ -493,7 +490,7 @@
           <a:p>
             <a:fld id="{F746C99E-1662-4343-82EB-EE2952C19028}" type="datetimeFigureOut">
               <a:rPr lang="pt-BR" smtClean="0"/>
-              <a:t>30/03/2021</a:t>
+              <a:t>31/03/2021</a:t>
             </a:fld>
             <a:endParaRPr lang="pt-BR"/>
           </a:p>
@@ -1023,7 +1020,7 @@
           <a:p>
             <a:fld id="{080DFA31-8C8A-4704-967F-6616FC98D181}" type="datetimeFigureOut">
               <a:rPr lang="pt-BR" smtClean="0"/>
-              <a:t>30/03/2021</a:t>
+              <a:t>31/03/2021</a:t>
             </a:fld>
             <a:endParaRPr lang="pt-BR"/>
           </a:p>
@@ -1191,7 +1188,7 @@
           <a:p>
             <a:fld id="{080DFA31-8C8A-4704-967F-6616FC98D181}" type="datetimeFigureOut">
               <a:rPr lang="pt-BR" smtClean="0"/>
-              <a:t>30/03/2021</a:t>
+              <a:t>31/03/2021</a:t>
             </a:fld>
             <a:endParaRPr lang="pt-BR"/>
           </a:p>
@@ -1369,7 +1366,7 @@
           <a:p>
             <a:fld id="{080DFA31-8C8A-4704-967F-6616FC98D181}" type="datetimeFigureOut">
               <a:rPr lang="pt-BR" smtClean="0"/>
-              <a:t>30/03/2021</a:t>
+              <a:t>31/03/2021</a:t>
             </a:fld>
             <a:endParaRPr lang="pt-BR"/>
           </a:p>
@@ -1537,7 +1534,7 @@
           <a:p>
             <a:fld id="{080DFA31-8C8A-4704-967F-6616FC98D181}" type="datetimeFigureOut">
               <a:rPr lang="pt-BR" smtClean="0"/>
-              <a:t>30/03/2021</a:t>
+              <a:t>31/03/2021</a:t>
             </a:fld>
             <a:endParaRPr lang="pt-BR"/>
           </a:p>
@@ -1782,7 +1779,7 @@
           <a:p>
             <a:fld id="{080DFA31-8C8A-4704-967F-6616FC98D181}" type="datetimeFigureOut">
               <a:rPr lang="pt-BR" smtClean="0"/>
-              <a:t>30/03/2021</a:t>
+              <a:t>31/03/2021</a:t>
             </a:fld>
             <a:endParaRPr lang="pt-BR"/>
           </a:p>
@@ -2067,7 +2064,7 @@
           <a:p>
             <a:fld id="{080DFA31-8C8A-4704-967F-6616FC98D181}" type="datetimeFigureOut">
               <a:rPr lang="pt-BR" smtClean="0"/>
-              <a:t>30/03/2021</a:t>
+              <a:t>31/03/2021</a:t>
             </a:fld>
             <a:endParaRPr lang="pt-BR"/>
           </a:p>
@@ -2486,7 +2483,7 @@
           <a:p>
             <a:fld id="{080DFA31-8C8A-4704-967F-6616FC98D181}" type="datetimeFigureOut">
               <a:rPr lang="pt-BR" smtClean="0"/>
-              <a:t>30/03/2021</a:t>
+              <a:t>31/03/2021</a:t>
             </a:fld>
             <a:endParaRPr lang="pt-BR"/>
           </a:p>
@@ -2603,7 +2600,7 @@
           <a:p>
             <a:fld id="{080DFA31-8C8A-4704-967F-6616FC98D181}" type="datetimeFigureOut">
               <a:rPr lang="pt-BR" smtClean="0"/>
-              <a:t>30/03/2021</a:t>
+              <a:t>31/03/2021</a:t>
             </a:fld>
             <a:endParaRPr lang="pt-BR"/>
           </a:p>
@@ -2698,7 +2695,7 @@
           <a:p>
             <a:fld id="{080DFA31-8C8A-4704-967F-6616FC98D181}" type="datetimeFigureOut">
               <a:rPr lang="pt-BR" smtClean="0"/>
-              <a:t>30/03/2021</a:t>
+              <a:t>31/03/2021</a:t>
             </a:fld>
             <a:endParaRPr lang="pt-BR"/>
           </a:p>
@@ -2973,7 +2970,7 @@
           <a:p>
             <a:fld id="{080DFA31-8C8A-4704-967F-6616FC98D181}" type="datetimeFigureOut">
               <a:rPr lang="pt-BR" smtClean="0"/>
-              <a:t>30/03/2021</a:t>
+              <a:t>31/03/2021</a:t>
             </a:fld>
             <a:endParaRPr lang="pt-BR"/>
           </a:p>
@@ -3225,7 +3222,7 @@
           <a:p>
             <a:fld id="{080DFA31-8C8A-4704-967F-6616FC98D181}" type="datetimeFigureOut">
               <a:rPr lang="pt-BR" smtClean="0"/>
-              <a:t>30/03/2021</a:t>
+              <a:t>31/03/2021</a:t>
             </a:fld>
             <a:endParaRPr lang="pt-BR"/>
           </a:p>
@@ -3436,7 +3433,7 @@
           <a:p>
             <a:fld id="{080DFA31-8C8A-4704-967F-6616FC98D181}" type="datetimeFigureOut">
               <a:rPr lang="pt-BR" smtClean="0"/>
-              <a:t>30/03/2021</a:t>
+              <a:t>31/03/2021</a:t>
             </a:fld>
             <a:endParaRPr lang="pt-BR"/>
           </a:p>
@@ -3846,13 +3843,7 @@
       </p:sp>
       <p:pic>
         <p:nvPicPr>
-          <p:cNvPr id="4" name="Imagem 3" descr="Interface gráfica do usuário, Texto, Aplicativo, Email&#10;&#10;Descrição gerada automaticamente">
-            <a:extLst>
-              <a:ext uri="{FF2B5EF4-FFF2-40B4-BE49-F238E27FC236}">
-                <a16:creationId xmlns:a16="http://schemas.microsoft.com/office/drawing/2014/main" id="{366B3D47-BBF0-4D29-A8BE-33A00EA622B6}"/>
-              </a:ext>
-            </a:extLst>
-          </p:cNvPr>
+          <p:cNvPr id="2" name="Imagem 1"/>
           <p:cNvPicPr>
             <a:picLocks noChangeAspect="1"/>
           </p:cNvPicPr>
@@ -3872,8 +3863,8 @@
         </p:blipFill>
         <p:spPr>
           <a:xfrm>
-            <a:off x="611560" y="2564904"/>
-            <a:ext cx="8136904" cy="2159862"/>
+            <a:off x="979612" y="2708920"/>
+            <a:ext cx="7058025" cy="1533525"/>
           </a:xfrm>
           <a:prstGeom prst="rect">
             <a:avLst/>
@@ -3948,7 +3939,7 @@
           <p:cNvPr id="7" name="Imagem 6" descr="Uma imagem contendo Interface gráfica do usuário&#10;&#10;Descrição gerada automaticamente">
             <a:extLst>
               <a:ext uri="{FF2B5EF4-FFF2-40B4-BE49-F238E27FC236}">
-                <a16:creationId xmlns:a16="http://schemas.microsoft.com/office/drawing/2014/main" id="{C49313D5-A1B3-4501-BC6F-616438DEAE7B}"/>
+                <a16:creationId xmlns:a16="http://schemas.microsoft.com/office/drawing/2014/main" xmlns="" id="{C49313D5-A1B3-4501-BC6F-616438DEAE7B}"/>
               </a:ext>
             </a:extLst>
           </p:cNvPr>
@@ -4037,106 +4028,19 @@
                 <a:latin typeface="Arial" pitchFamily="34" charset="0"/>
                 <a:cs typeface="Arial" pitchFamily="34" charset="0"/>
               </a:rPr>
-              <a:t>Cenário: Realizar Provas</a:t>
-            </a:r>
-          </a:p>
-        </p:txBody>
-      </p:sp>
-      <p:pic>
-        <p:nvPicPr>
-          <p:cNvPr id="13" name="Imagem 12" descr="Diagrama&#10;&#10;Descrição gerada automaticamente">
-            <a:extLst>
-              <a:ext uri="{FF2B5EF4-FFF2-40B4-BE49-F238E27FC236}">
-                <a16:creationId xmlns:a16="http://schemas.microsoft.com/office/drawing/2014/main" id="{384C644D-0FA7-4F0E-957A-B72E1345C62C}"/>
-              </a:ext>
-            </a:extLst>
-          </p:cNvPr>
-          <p:cNvPicPr>
-            <a:picLocks noChangeAspect="1"/>
-          </p:cNvPicPr>
-          <p:nvPr/>
-        </p:nvPicPr>
-        <p:blipFill rotWithShape="1">
-          <a:blip r:embed="rId2">
-            <a:extLst>
-              <a:ext uri="{28A0092B-C50C-407E-A947-70E740481C1C}">
-                <a14:useLocalDpi xmlns:a14="http://schemas.microsoft.com/office/drawing/2010/main" val="0"/>
-              </a:ext>
-            </a:extLst>
-          </a:blip>
-          <a:srcRect l="858" r="12473" b="22683"/>
-          <a:stretch/>
-        </p:blipFill>
-        <p:spPr>
-          <a:xfrm>
-            <a:off x="1043608" y="2492896"/>
-            <a:ext cx="7676853" cy="2736304"/>
-          </a:xfrm>
-          <a:prstGeom prst="rect">
-            <a:avLst/>
-          </a:prstGeom>
-        </p:spPr>
-      </p:pic>
-    </p:spTree>
-    <p:extLst>
-      <p:ext uri="{BB962C8B-B14F-4D97-AF65-F5344CB8AC3E}">
-        <p14:creationId xmlns:p14="http://schemas.microsoft.com/office/powerpoint/2010/main" val="1967559346"/>
-      </p:ext>
-    </p:extLst>
-  </p:cSld>
-  <p:clrMapOvr>
-    <a:masterClrMapping/>
-  </p:clrMapOvr>
-</p:sld>
-</file>
-
-<file path=ppt/slides/slide4.xml><?xml version="1.0" encoding="utf-8"?>
-<p:sld xmlns:a="http://schemas.openxmlformats.org/drawingml/2006/main" xmlns:r="http://schemas.openxmlformats.org/officeDocument/2006/relationships" xmlns:p="http://schemas.openxmlformats.org/presentationml/2006/main">
-  <p:cSld>
-    <p:spTree>
-      <p:nvGrpSpPr>
-        <p:cNvPr id="1" name=""/>
-        <p:cNvGrpSpPr/>
-        <p:nvPr/>
-      </p:nvGrpSpPr>
-      <p:grpSpPr>
-        <a:xfrm>
-          <a:off x="0" y="0"/>
-          <a:ext cx="0" cy="0"/>
-          <a:chOff x="0" y="0"/>
-          <a:chExt cx="0" cy="0"/>
-        </a:xfrm>
-      </p:grpSpPr>
-      <p:sp>
-        <p:nvSpPr>
-          <p:cNvPr id="3" name="CaixaDeTexto 2"/>
-          <p:cNvSpPr txBox="1"/>
-          <p:nvPr/>
-        </p:nvSpPr>
-        <p:spPr>
-          <a:xfrm>
-            <a:off x="0" y="836712"/>
-            <a:ext cx="9144000" cy="461665"/>
-          </a:xfrm>
-          <a:prstGeom prst="rect">
-            <a:avLst/>
-          </a:prstGeom>
-          <a:noFill/>
-        </p:spPr>
-        <p:txBody>
-          <a:bodyPr wrap="square" rtlCol="0">
-            <a:spAutoFit/>
-          </a:bodyPr>
-          <a:lstStyle/>
-          <a:p>
-            <a:pPr algn="ctr"/>
-            <a:r>
-              <a:rPr lang="pt-BR" sz="2400" b="1" dirty="0">
+              <a:t>Cenário: Visualizar </a:t>
+            </a:r>
+            <a:r>
+              <a:rPr lang="pt-BR" sz="2400" b="1" dirty="0" smtClean="0">
                 <a:latin typeface="Arial" pitchFamily="34" charset="0"/>
                 <a:cs typeface="Arial" pitchFamily="34" charset="0"/>
               </a:rPr>
-              <a:t>Cenário: Visualizar Resultado das Provas</a:t>
-            </a:r>
+              <a:t>Resultado</a:t>
+            </a:r>
+            <a:endParaRPr lang="pt-BR" sz="2400" b="1" dirty="0">
+              <a:latin typeface="Arial" pitchFamily="34" charset="0"/>
+              <a:cs typeface="Arial" pitchFamily="34" charset="0"/>
+            </a:endParaRPr>
           </a:p>
         </p:txBody>
       </p:sp>
@@ -4145,7 +4049,7 @@
           <p:cNvPr id="5" name="Imagem 4" descr="Diagrama&#10;&#10;Descrição gerada automaticamente">
             <a:extLst>
               <a:ext uri="{FF2B5EF4-FFF2-40B4-BE49-F238E27FC236}">
-                <a16:creationId xmlns:a16="http://schemas.microsoft.com/office/drawing/2014/main" id="{67AAD100-0D84-4C72-A1BE-2594F7A257E0}"/>
+                <a16:creationId xmlns:a16="http://schemas.microsoft.com/office/drawing/2014/main" xmlns="" id="{67AAD100-0D84-4C72-A1BE-2594F7A257E0}"/>
               </a:ext>
             </a:extLst>
           </p:cNvPr>
@@ -4188,7 +4092,7 @@
 </p:sld>
 </file>
 
-<file path=ppt/slides/slide5.xml><?xml version="1.0" encoding="utf-8"?>
+<file path=ppt/slides/slide4.xml><?xml version="1.0" encoding="utf-8"?>
 <p:sld xmlns:a="http://schemas.openxmlformats.org/drawingml/2006/main" xmlns:r="http://schemas.openxmlformats.org/officeDocument/2006/relationships" xmlns:p="http://schemas.openxmlformats.org/presentationml/2006/main">
   <p:cSld>
     <p:spTree>
@@ -4233,205 +4137,21 @@
                 <a:latin typeface="Arial" pitchFamily="34" charset="0"/>
                 <a:cs typeface="Arial" pitchFamily="34" charset="0"/>
               </a:rPr>
-              <a:t>Cenário: Entregar Documentação</a:t>
-            </a:r>
-          </a:p>
-        </p:txBody>
-      </p:sp>
-      <p:pic>
-        <p:nvPicPr>
-          <p:cNvPr id="5" name="Imagem 4" descr="Forma&#10;&#10;Descrição gerada automaticamente">
-            <a:extLst>
-              <a:ext uri="{FF2B5EF4-FFF2-40B4-BE49-F238E27FC236}">
-                <a16:creationId xmlns:a16="http://schemas.microsoft.com/office/drawing/2014/main" id="{DE0BE3FA-D448-4B30-828F-4FCEFEE94C33}"/>
-              </a:ext>
-            </a:extLst>
-          </p:cNvPr>
-          <p:cNvPicPr>
-            <a:picLocks noChangeAspect="1"/>
-          </p:cNvPicPr>
-          <p:nvPr/>
-        </p:nvPicPr>
-        <p:blipFill>
-          <a:blip r:embed="rId2">
-            <a:extLst>
-              <a:ext uri="{28A0092B-C50C-407E-A947-70E740481C1C}">
-                <a14:useLocalDpi xmlns:a14="http://schemas.microsoft.com/office/drawing/2010/main" val="0"/>
-              </a:ext>
-            </a:extLst>
-          </a:blip>
-          <a:stretch>
-            <a:fillRect/>
-          </a:stretch>
-        </p:blipFill>
-        <p:spPr>
-          <a:xfrm>
-            <a:off x="575556" y="2492896"/>
-            <a:ext cx="7992888" cy="2707442"/>
-          </a:xfrm>
-          <a:prstGeom prst="rect">
-            <a:avLst/>
-          </a:prstGeom>
-        </p:spPr>
-      </p:pic>
-    </p:spTree>
-    <p:extLst>
-      <p:ext uri="{BB962C8B-B14F-4D97-AF65-F5344CB8AC3E}">
-        <p14:creationId xmlns:p14="http://schemas.microsoft.com/office/powerpoint/2010/main" val="2204209709"/>
-      </p:ext>
-    </p:extLst>
-  </p:cSld>
-  <p:clrMapOvr>
-    <a:masterClrMapping/>
-  </p:clrMapOvr>
-</p:sld>
-</file>
-
-<file path=ppt/slides/slide6.xml><?xml version="1.0" encoding="utf-8"?>
-<p:sld xmlns:a="http://schemas.openxmlformats.org/drawingml/2006/main" xmlns:r="http://schemas.openxmlformats.org/officeDocument/2006/relationships" xmlns:p="http://schemas.openxmlformats.org/presentationml/2006/main">
-  <p:cSld>
-    <p:spTree>
-      <p:nvGrpSpPr>
-        <p:cNvPr id="1" name=""/>
-        <p:cNvGrpSpPr/>
-        <p:nvPr/>
-      </p:nvGrpSpPr>
-      <p:grpSpPr>
-        <a:xfrm>
-          <a:off x="0" y="0"/>
-          <a:ext cx="0" cy="0"/>
-          <a:chOff x="0" y="0"/>
-          <a:chExt cx="0" cy="0"/>
-        </a:xfrm>
-      </p:grpSpPr>
-      <p:sp>
-        <p:nvSpPr>
-          <p:cNvPr id="3" name="CaixaDeTexto 2"/>
-          <p:cNvSpPr txBox="1"/>
-          <p:nvPr/>
-        </p:nvSpPr>
-        <p:spPr>
-          <a:xfrm>
-            <a:off x="0" y="836712"/>
-            <a:ext cx="9144000" cy="461665"/>
-          </a:xfrm>
-          <a:prstGeom prst="rect">
-            <a:avLst/>
-          </a:prstGeom>
-          <a:noFill/>
-        </p:spPr>
-        <p:txBody>
-          <a:bodyPr wrap="square" rtlCol="0">
-            <a:spAutoFit/>
-          </a:bodyPr>
-          <a:lstStyle/>
-          <a:p>
-            <a:pPr algn="ctr"/>
+              <a:t>Cenário: </a:t>
+            </a:r>
+            <a:r>
+              <a:rPr lang="pt-BR" sz="2400" b="1" dirty="0" smtClean="0">
+                <a:latin typeface="Arial" pitchFamily="34" charset="0"/>
+                <a:cs typeface="Arial" pitchFamily="34" charset="0"/>
+              </a:rPr>
+              <a:t>Efetivar </a:t>
+            </a:r>
             <a:r>
               <a:rPr lang="pt-BR" sz="2400" b="1" dirty="0">
                 <a:latin typeface="Arial" pitchFamily="34" charset="0"/>
                 <a:cs typeface="Arial" pitchFamily="34" charset="0"/>
               </a:rPr>
-              <a:t>Cenário: Visualizar Resultado da Documentação</a:t>
-            </a:r>
-          </a:p>
-        </p:txBody>
-      </p:sp>
-      <p:pic>
-        <p:nvPicPr>
-          <p:cNvPr id="5" name="Imagem 4" descr="Forma&#10;&#10;Descrição gerada automaticamente com confiança média">
-            <a:extLst>
-              <a:ext uri="{FF2B5EF4-FFF2-40B4-BE49-F238E27FC236}">
-                <a16:creationId xmlns:a16="http://schemas.microsoft.com/office/drawing/2014/main" id="{08605365-73D4-49F2-8B29-13B48B533776}"/>
-              </a:ext>
-            </a:extLst>
-          </p:cNvPr>
-          <p:cNvPicPr>
-            <a:picLocks noChangeAspect="1"/>
-          </p:cNvPicPr>
-          <p:nvPr/>
-        </p:nvPicPr>
-        <p:blipFill>
-          <a:blip r:embed="rId2">
-            <a:extLst>
-              <a:ext uri="{28A0092B-C50C-407E-A947-70E740481C1C}">
-                <a14:useLocalDpi xmlns:a14="http://schemas.microsoft.com/office/drawing/2010/main" val="0"/>
-              </a:ext>
-            </a:extLst>
-          </a:blip>
-          <a:stretch>
-            <a:fillRect/>
-          </a:stretch>
-        </p:blipFill>
-        <p:spPr>
-          <a:xfrm>
-            <a:off x="683568" y="2636912"/>
-            <a:ext cx="7921501" cy="2693952"/>
-          </a:xfrm>
-          <a:prstGeom prst="rect">
-            <a:avLst/>
-          </a:prstGeom>
-        </p:spPr>
-      </p:pic>
-    </p:spTree>
-    <p:extLst>
-      <p:ext uri="{BB962C8B-B14F-4D97-AF65-F5344CB8AC3E}">
-        <p14:creationId xmlns:p14="http://schemas.microsoft.com/office/powerpoint/2010/main" val="1317682410"/>
-      </p:ext>
-    </p:extLst>
-  </p:cSld>
-  <p:clrMapOvr>
-    <a:masterClrMapping/>
-  </p:clrMapOvr>
-</p:sld>
-</file>
-
-<file path=ppt/slides/slide7.xml><?xml version="1.0" encoding="utf-8"?>
-<p:sld xmlns:a="http://schemas.openxmlformats.org/drawingml/2006/main" xmlns:r="http://schemas.openxmlformats.org/officeDocument/2006/relationships" xmlns:p="http://schemas.openxmlformats.org/presentationml/2006/main">
-  <p:cSld>
-    <p:spTree>
-      <p:nvGrpSpPr>
-        <p:cNvPr id="1" name=""/>
-        <p:cNvGrpSpPr/>
-        <p:nvPr/>
-      </p:nvGrpSpPr>
-      <p:grpSpPr>
-        <a:xfrm>
-          <a:off x="0" y="0"/>
-          <a:ext cx="0" cy="0"/>
-          <a:chOff x="0" y="0"/>
-          <a:chExt cx="0" cy="0"/>
-        </a:xfrm>
-      </p:grpSpPr>
-      <p:sp>
-        <p:nvSpPr>
-          <p:cNvPr id="3" name="CaixaDeTexto 2"/>
-          <p:cNvSpPr txBox="1"/>
-          <p:nvPr/>
-        </p:nvSpPr>
-        <p:spPr>
-          <a:xfrm>
-            <a:off x="0" y="836712"/>
-            <a:ext cx="9144000" cy="461665"/>
-          </a:xfrm>
-          <a:prstGeom prst="rect">
-            <a:avLst/>
-          </a:prstGeom>
-          <a:noFill/>
-        </p:spPr>
-        <p:txBody>
-          <a:bodyPr wrap="square" rtlCol="0">
-            <a:spAutoFit/>
-          </a:bodyPr>
-          <a:lstStyle/>
-          <a:p>
-            <a:pPr algn="ctr"/>
-            <a:r>
-              <a:rPr lang="pt-BR" sz="2400" b="1" dirty="0">
-                <a:latin typeface="Arial" pitchFamily="34" charset="0"/>
-                <a:cs typeface="Arial" pitchFamily="34" charset="0"/>
-              </a:rPr>
-              <a:t>Cenário: Fazer Matrícula</a:t>
+              <a:t>Matrícula</a:t>
             </a:r>
           </a:p>
         </p:txBody>
@@ -4441,7 +4161,7 @@
           <p:cNvPr id="7" name="Imagem 6" descr="Forma&#10;&#10;Descrição gerada automaticamente com confiança média">
             <a:extLst>
               <a:ext uri="{FF2B5EF4-FFF2-40B4-BE49-F238E27FC236}">
-                <a16:creationId xmlns:a16="http://schemas.microsoft.com/office/drawing/2014/main" id="{FF66E299-9BC2-40E3-852F-7A848AB656A7}"/>
+                <a16:creationId xmlns:a16="http://schemas.microsoft.com/office/drawing/2014/main" xmlns="" id="{FF66E299-9BC2-40E3-852F-7A848AB656A7}"/>
               </a:ext>
             </a:extLst>
           </p:cNvPr>

</xml_diff>

<commit_message>
Artefatos 15 - 19
</commit_message>
<xml_diff>
--- a/Artefatos/15 - Arquitetura de Negócio para cada Cenário.pptx
+++ b/Artefatos/15 - Arquitetura de Negócio para cada Cenário.pptx
@@ -5,13 +5,15 @@
     <p:sldMasterId id="2147483648" r:id="rId1"/>
   </p:sldMasterIdLst>
   <p:notesMasterIdLst>
-    <p:notesMasterId r:id="rId6"/>
+    <p:notesMasterId r:id="rId8"/>
   </p:notesMasterIdLst>
   <p:sldIdLst>
     <p:sldId id="257" r:id="rId2"/>
     <p:sldId id="258" r:id="rId3"/>
     <p:sldId id="262" r:id="rId4"/>
-    <p:sldId id="263" r:id="rId5"/>
+    <p:sldId id="264" r:id="rId5"/>
+    <p:sldId id="263" r:id="rId6"/>
+    <p:sldId id="265" r:id="rId7"/>
   </p:sldIdLst>
   <p:sldSz cx="9144000" cy="6858000" type="screen4x3"/>
   <p:notesSz cx="6858000" cy="9144000"/>
@@ -112,7 +114,7 @@
   </p:defaultTextStyle>
   <p:extLst>
     <p:ext uri="{EFAFB233-063F-42B5-8137-9DF3F51BA10A}">
-      <p15:sldGuideLst xmlns:p15="http://schemas.microsoft.com/office/powerpoint/2012/main" xmlns="">
+      <p15:sldGuideLst xmlns:p15="http://schemas.microsoft.com/office/powerpoint/2012/main">
         <p15:guide id="1" orient="horz" pos="2160">
           <p15:clr>
             <a:srgbClr val="A4A3A4"/>
@@ -490,7 +492,7 @@
           <a:p>
             <a:fld id="{F746C99E-1662-4343-82EB-EE2952C19028}" type="datetimeFigureOut">
               <a:rPr lang="pt-BR" smtClean="0"/>
-              <a:t>31/03/2021</a:t>
+              <a:t>08/04/2021</a:t>
             </a:fld>
             <a:endParaRPr lang="pt-BR"/>
           </a:p>
@@ -1020,7 +1022,7 @@
           <a:p>
             <a:fld id="{080DFA31-8C8A-4704-967F-6616FC98D181}" type="datetimeFigureOut">
               <a:rPr lang="pt-BR" smtClean="0"/>
-              <a:t>31/03/2021</a:t>
+              <a:t>08/04/2021</a:t>
             </a:fld>
             <a:endParaRPr lang="pt-BR"/>
           </a:p>
@@ -1188,7 +1190,7 @@
           <a:p>
             <a:fld id="{080DFA31-8C8A-4704-967F-6616FC98D181}" type="datetimeFigureOut">
               <a:rPr lang="pt-BR" smtClean="0"/>
-              <a:t>31/03/2021</a:t>
+              <a:t>08/04/2021</a:t>
             </a:fld>
             <a:endParaRPr lang="pt-BR"/>
           </a:p>
@@ -1366,7 +1368,7 @@
           <a:p>
             <a:fld id="{080DFA31-8C8A-4704-967F-6616FC98D181}" type="datetimeFigureOut">
               <a:rPr lang="pt-BR" smtClean="0"/>
-              <a:t>31/03/2021</a:t>
+              <a:t>08/04/2021</a:t>
             </a:fld>
             <a:endParaRPr lang="pt-BR"/>
           </a:p>
@@ -1534,7 +1536,7 @@
           <a:p>
             <a:fld id="{080DFA31-8C8A-4704-967F-6616FC98D181}" type="datetimeFigureOut">
               <a:rPr lang="pt-BR" smtClean="0"/>
-              <a:t>31/03/2021</a:t>
+              <a:t>08/04/2021</a:t>
             </a:fld>
             <a:endParaRPr lang="pt-BR"/>
           </a:p>
@@ -1779,7 +1781,7 @@
           <a:p>
             <a:fld id="{080DFA31-8C8A-4704-967F-6616FC98D181}" type="datetimeFigureOut">
               <a:rPr lang="pt-BR" smtClean="0"/>
-              <a:t>31/03/2021</a:t>
+              <a:t>08/04/2021</a:t>
             </a:fld>
             <a:endParaRPr lang="pt-BR"/>
           </a:p>
@@ -2064,7 +2066,7 @@
           <a:p>
             <a:fld id="{080DFA31-8C8A-4704-967F-6616FC98D181}" type="datetimeFigureOut">
               <a:rPr lang="pt-BR" smtClean="0"/>
-              <a:t>31/03/2021</a:t>
+              <a:t>08/04/2021</a:t>
             </a:fld>
             <a:endParaRPr lang="pt-BR"/>
           </a:p>
@@ -2483,7 +2485,7 @@
           <a:p>
             <a:fld id="{080DFA31-8C8A-4704-967F-6616FC98D181}" type="datetimeFigureOut">
               <a:rPr lang="pt-BR" smtClean="0"/>
-              <a:t>31/03/2021</a:t>
+              <a:t>08/04/2021</a:t>
             </a:fld>
             <a:endParaRPr lang="pt-BR"/>
           </a:p>
@@ -2600,7 +2602,7 @@
           <a:p>
             <a:fld id="{080DFA31-8C8A-4704-967F-6616FC98D181}" type="datetimeFigureOut">
               <a:rPr lang="pt-BR" smtClean="0"/>
-              <a:t>31/03/2021</a:t>
+              <a:t>08/04/2021</a:t>
             </a:fld>
             <a:endParaRPr lang="pt-BR"/>
           </a:p>
@@ -2695,7 +2697,7 @@
           <a:p>
             <a:fld id="{080DFA31-8C8A-4704-967F-6616FC98D181}" type="datetimeFigureOut">
               <a:rPr lang="pt-BR" smtClean="0"/>
-              <a:t>31/03/2021</a:t>
+              <a:t>08/04/2021</a:t>
             </a:fld>
             <a:endParaRPr lang="pt-BR"/>
           </a:p>
@@ -2970,7 +2972,7 @@
           <a:p>
             <a:fld id="{080DFA31-8C8A-4704-967F-6616FC98D181}" type="datetimeFigureOut">
               <a:rPr lang="pt-BR" smtClean="0"/>
-              <a:t>31/03/2021</a:t>
+              <a:t>08/04/2021</a:t>
             </a:fld>
             <a:endParaRPr lang="pt-BR"/>
           </a:p>
@@ -3222,7 +3224,7 @@
           <a:p>
             <a:fld id="{080DFA31-8C8A-4704-967F-6616FC98D181}" type="datetimeFigureOut">
               <a:rPr lang="pt-BR" smtClean="0"/>
-              <a:t>31/03/2021</a:t>
+              <a:t>08/04/2021</a:t>
             </a:fld>
             <a:endParaRPr lang="pt-BR"/>
           </a:p>
@@ -3433,7 +3435,7 @@
           <a:p>
             <a:fld id="{080DFA31-8C8A-4704-967F-6616FC98D181}" type="datetimeFigureOut">
               <a:rPr lang="pt-BR" smtClean="0"/>
-              <a:t>31/03/2021</a:t>
+              <a:t>08/04/2021</a:t>
             </a:fld>
             <a:endParaRPr lang="pt-BR"/>
           </a:p>
@@ -3843,7 +3845,13 @@
       </p:sp>
       <p:pic>
         <p:nvPicPr>
-          <p:cNvPr id="2" name="Imagem 1"/>
+          <p:cNvPr id="4" name="Imagem 3" descr="Texto&#10;&#10;Descrição gerada automaticamente">
+            <a:extLst>
+              <a:ext uri="{FF2B5EF4-FFF2-40B4-BE49-F238E27FC236}">
+                <a16:creationId xmlns:a16="http://schemas.microsoft.com/office/drawing/2014/main" id="{4A0124A6-0403-48B3-BBEF-9A1E059AD759}"/>
+              </a:ext>
+            </a:extLst>
+          </p:cNvPr>
           <p:cNvPicPr>
             <a:picLocks noChangeAspect="1"/>
           </p:cNvPicPr>
@@ -3863,8 +3871,8 @@
         </p:blipFill>
         <p:spPr>
           <a:xfrm>
-            <a:off x="979612" y="2708920"/>
-            <a:ext cx="7058025" cy="1533525"/>
+            <a:off x="757237" y="2424112"/>
+            <a:ext cx="7629525" cy="2009775"/>
           </a:xfrm>
           <a:prstGeom prst="rect">
             <a:avLst/>
@@ -3929,17 +3937,17 @@
                 <a:latin typeface="Arial" pitchFamily="34" charset="0"/>
                 <a:cs typeface="Arial" pitchFamily="34" charset="0"/>
               </a:rPr>
-              <a:t>Cenário: Fazer Inscrição</a:t>
+              <a:t>Cenário: Verificar Cursos Disponíveis</a:t>
             </a:r>
           </a:p>
         </p:txBody>
       </p:sp>
       <p:pic>
         <p:nvPicPr>
-          <p:cNvPr id="7" name="Imagem 6" descr="Uma imagem contendo Interface gráfica do usuário&#10;&#10;Descrição gerada automaticamente">
+          <p:cNvPr id="3" name="Imagem 2" descr="Uma imagem contendo Forma&#10;&#10;Descrição gerada automaticamente">
             <a:extLst>
               <a:ext uri="{FF2B5EF4-FFF2-40B4-BE49-F238E27FC236}">
-                <a16:creationId xmlns:a16="http://schemas.microsoft.com/office/drawing/2014/main" xmlns="" id="{C49313D5-A1B3-4501-BC6F-616438DEAE7B}"/>
+                <a16:creationId xmlns:a16="http://schemas.microsoft.com/office/drawing/2014/main" id="{5AA20B3F-5545-4ED1-9AC6-5B4299D4A8A8}"/>
               </a:ext>
             </a:extLst>
           </p:cNvPr>
@@ -3962,8 +3970,8 @@
         </p:blipFill>
         <p:spPr>
           <a:xfrm>
-            <a:off x="593812" y="2348880"/>
-            <a:ext cx="7956376" cy="2691443"/>
+            <a:off x="571500" y="1781175"/>
+            <a:ext cx="8001000" cy="3295650"/>
           </a:xfrm>
           <a:prstGeom prst="rect">
             <a:avLst/>
@@ -4028,28 +4036,17 @@
                 <a:latin typeface="Arial" pitchFamily="34" charset="0"/>
                 <a:cs typeface="Arial" pitchFamily="34" charset="0"/>
               </a:rPr>
-              <a:t>Cenário: Visualizar </a:t>
-            </a:r>
-            <a:r>
-              <a:rPr lang="pt-BR" sz="2400" b="1" dirty="0" smtClean="0">
-                <a:latin typeface="Arial" pitchFamily="34" charset="0"/>
-                <a:cs typeface="Arial" pitchFamily="34" charset="0"/>
-              </a:rPr>
-              <a:t>Resultado</a:t>
-            </a:r>
-            <a:endParaRPr lang="pt-BR" sz="2400" b="1" dirty="0">
-              <a:latin typeface="Arial" pitchFamily="34" charset="0"/>
-              <a:cs typeface="Arial" pitchFamily="34" charset="0"/>
-            </a:endParaRPr>
+              <a:t>Cenário: Realizar Inscrição em um Curso</a:t>
+            </a:r>
           </a:p>
         </p:txBody>
       </p:sp>
       <p:pic>
         <p:nvPicPr>
-          <p:cNvPr id="5" name="Imagem 4" descr="Diagrama&#10;&#10;Descrição gerada automaticamente">
+          <p:cNvPr id="4" name="Imagem 3" descr="Uma imagem contendo Diagrama&#10;&#10;Descrição gerada automaticamente">
             <a:extLst>
               <a:ext uri="{FF2B5EF4-FFF2-40B4-BE49-F238E27FC236}">
-                <a16:creationId xmlns:a16="http://schemas.microsoft.com/office/drawing/2014/main" xmlns="" id="{67AAD100-0D84-4C72-A1BE-2594F7A257E0}"/>
+                <a16:creationId xmlns:a16="http://schemas.microsoft.com/office/drawing/2014/main" id="{EB995D1F-1896-4C74-BE22-4CFB641AA06C}"/>
               </a:ext>
             </a:extLst>
           </p:cNvPr>
@@ -4058,7 +4055,7 @@
           </p:cNvPicPr>
           <p:nvPr/>
         </p:nvPicPr>
-        <p:blipFill rotWithShape="1">
+        <p:blipFill>
           <a:blip r:embed="rId2">
             <a:extLst>
               <a:ext uri="{28A0092B-C50C-407E-A947-70E740481C1C}">
@@ -4066,13 +4063,14 @@
               </a:ext>
             </a:extLst>
           </a:blip>
-          <a:srcRect r="17095"/>
-          <a:stretch/>
+          <a:stretch>
+            <a:fillRect/>
+          </a:stretch>
         </p:blipFill>
         <p:spPr>
           <a:xfrm>
-            <a:off x="755576" y="2564904"/>
-            <a:ext cx="7854524" cy="3096344"/>
+            <a:off x="566737" y="1781175"/>
+            <a:ext cx="8010525" cy="3295650"/>
           </a:xfrm>
           <a:prstGeom prst="rect">
             <a:avLst/>
@@ -4137,31 +4135,17 @@
                 <a:latin typeface="Arial" pitchFamily="34" charset="0"/>
                 <a:cs typeface="Arial" pitchFamily="34" charset="0"/>
               </a:rPr>
-              <a:t>Cenário: </a:t>
-            </a:r>
-            <a:r>
-              <a:rPr lang="pt-BR" sz="2400" b="1" dirty="0" smtClean="0">
-                <a:latin typeface="Arial" pitchFamily="34" charset="0"/>
-                <a:cs typeface="Arial" pitchFamily="34" charset="0"/>
-              </a:rPr>
-              <a:t>Efetivar </a:t>
-            </a:r>
-            <a:r>
-              <a:rPr lang="pt-BR" sz="2400" b="1" dirty="0">
-                <a:latin typeface="Arial" pitchFamily="34" charset="0"/>
-                <a:cs typeface="Arial" pitchFamily="34" charset="0"/>
-              </a:rPr>
-              <a:t>Matrícula</a:t>
+              <a:t>Cenário: Fazer Prova de Processo Seletivo</a:t>
             </a:r>
           </a:p>
         </p:txBody>
       </p:sp>
       <p:pic>
         <p:nvPicPr>
-          <p:cNvPr id="7" name="Imagem 6" descr="Forma&#10;&#10;Descrição gerada automaticamente com confiança média">
+          <p:cNvPr id="5" name="Imagem 4" descr="Uma imagem contendo Diagrama&#10;&#10;Descrição gerada automaticamente">
             <a:extLst>
               <a:ext uri="{FF2B5EF4-FFF2-40B4-BE49-F238E27FC236}">
-                <a16:creationId xmlns:a16="http://schemas.microsoft.com/office/drawing/2014/main" xmlns="" id="{FF66E299-9BC2-40E3-852F-7A848AB656A7}"/>
+                <a16:creationId xmlns:a16="http://schemas.microsoft.com/office/drawing/2014/main" id="{5F5BEAF5-9E9C-4E13-9907-C449CB1DF014}"/>
               </a:ext>
             </a:extLst>
           </p:cNvPr>
@@ -4184,8 +4168,107 @@
         </p:blipFill>
         <p:spPr>
           <a:xfrm>
-            <a:off x="899592" y="2492896"/>
-            <a:ext cx="7834299" cy="2664296"/>
+            <a:off x="566737" y="1781175"/>
+            <a:ext cx="8010525" cy="3295650"/>
+          </a:xfrm>
+          <a:prstGeom prst="rect">
+            <a:avLst/>
+          </a:prstGeom>
+        </p:spPr>
+      </p:pic>
+    </p:spTree>
+    <p:extLst>
+      <p:ext uri="{BB962C8B-B14F-4D97-AF65-F5344CB8AC3E}">
+        <p14:creationId xmlns:p14="http://schemas.microsoft.com/office/powerpoint/2010/main" val="3072961784"/>
+      </p:ext>
+    </p:extLst>
+  </p:cSld>
+  <p:clrMapOvr>
+    <a:masterClrMapping/>
+  </p:clrMapOvr>
+</p:sld>
+</file>
+
+<file path=ppt/slides/slide5.xml><?xml version="1.0" encoding="utf-8"?>
+<p:sld xmlns:a="http://schemas.openxmlformats.org/drawingml/2006/main" xmlns:r="http://schemas.openxmlformats.org/officeDocument/2006/relationships" xmlns:p="http://schemas.openxmlformats.org/presentationml/2006/main">
+  <p:cSld>
+    <p:spTree>
+      <p:nvGrpSpPr>
+        <p:cNvPr id="1" name=""/>
+        <p:cNvGrpSpPr/>
+        <p:nvPr/>
+      </p:nvGrpSpPr>
+      <p:grpSpPr>
+        <a:xfrm>
+          <a:off x="0" y="0"/>
+          <a:ext cx="0" cy="0"/>
+          <a:chOff x="0" y="0"/>
+          <a:chExt cx="0" cy="0"/>
+        </a:xfrm>
+      </p:grpSpPr>
+      <p:sp>
+        <p:nvSpPr>
+          <p:cNvPr id="3" name="CaixaDeTexto 2"/>
+          <p:cNvSpPr txBox="1"/>
+          <p:nvPr/>
+        </p:nvSpPr>
+        <p:spPr>
+          <a:xfrm>
+            <a:off x="0" y="836712"/>
+            <a:ext cx="9144000" cy="461665"/>
+          </a:xfrm>
+          <a:prstGeom prst="rect">
+            <a:avLst/>
+          </a:prstGeom>
+          <a:noFill/>
+        </p:spPr>
+        <p:txBody>
+          <a:bodyPr wrap="square" rtlCol="0">
+            <a:spAutoFit/>
+          </a:bodyPr>
+          <a:lstStyle/>
+          <a:p>
+            <a:pPr algn="ctr"/>
+            <a:r>
+              <a:rPr lang="pt-BR" sz="2400" b="1" dirty="0">
+                <a:latin typeface="Arial" pitchFamily="34" charset="0"/>
+                <a:cs typeface="Arial" pitchFamily="34" charset="0"/>
+              </a:rPr>
+              <a:t>Cenário: Consultar Resultado de Processo Seletivo</a:t>
+            </a:r>
+          </a:p>
+        </p:txBody>
+      </p:sp>
+      <p:pic>
+        <p:nvPicPr>
+          <p:cNvPr id="4" name="Imagem 3" descr="Uma imagem contendo Diagrama&#10;&#10;Descrição gerada automaticamente">
+            <a:extLst>
+              <a:ext uri="{FF2B5EF4-FFF2-40B4-BE49-F238E27FC236}">
+                <a16:creationId xmlns:a16="http://schemas.microsoft.com/office/drawing/2014/main" id="{E8DE1071-75FE-4033-88B0-81F6CDB9DCAC}"/>
+              </a:ext>
+            </a:extLst>
+          </p:cNvPr>
+          <p:cNvPicPr>
+            <a:picLocks noChangeAspect="1"/>
+          </p:cNvPicPr>
+          <p:nvPr/>
+        </p:nvPicPr>
+        <p:blipFill>
+          <a:blip r:embed="rId2">
+            <a:extLst>
+              <a:ext uri="{28A0092B-C50C-407E-A947-70E740481C1C}">
+                <a14:useLocalDpi xmlns:a14="http://schemas.microsoft.com/office/drawing/2010/main" val="0"/>
+              </a:ext>
+            </a:extLst>
+          </a:blip>
+          <a:stretch>
+            <a:fillRect/>
+          </a:stretch>
+        </p:blipFill>
+        <p:spPr>
+          <a:xfrm>
+            <a:off x="566737" y="1781175"/>
+            <a:ext cx="8010525" cy="3295650"/>
           </a:xfrm>
           <a:prstGeom prst="rect">
             <a:avLst/>
@@ -4196,6 +4279,105 @@
     <p:extLst>
       <p:ext uri="{BB962C8B-B14F-4D97-AF65-F5344CB8AC3E}">
         <p14:creationId xmlns:p14="http://schemas.microsoft.com/office/powerpoint/2010/main" val="133914596"/>
+      </p:ext>
+    </p:extLst>
+  </p:cSld>
+  <p:clrMapOvr>
+    <a:masterClrMapping/>
+  </p:clrMapOvr>
+</p:sld>
+</file>
+
+<file path=ppt/slides/slide6.xml><?xml version="1.0" encoding="utf-8"?>
+<p:sld xmlns:a="http://schemas.openxmlformats.org/drawingml/2006/main" xmlns:r="http://schemas.openxmlformats.org/officeDocument/2006/relationships" xmlns:p="http://schemas.openxmlformats.org/presentationml/2006/main">
+  <p:cSld>
+    <p:spTree>
+      <p:nvGrpSpPr>
+        <p:cNvPr id="1" name=""/>
+        <p:cNvGrpSpPr/>
+        <p:nvPr/>
+      </p:nvGrpSpPr>
+      <p:grpSpPr>
+        <a:xfrm>
+          <a:off x="0" y="0"/>
+          <a:ext cx="0" cy="0"/>
+          <a:chOff x="0" y="0"/>
+          <a:chExt cx="0" cy="0"/>
+        </a:xfrm>
+      </p:grpSpPr>
+      <p:sp>
+        <p:nvSpPr>
+          <p:cNvPr id="3" name="CaixaDeTexto 2"/>
+          <p:cNvSpPr txBox="1"/>
+          <p:nvPr/>
+        </p:nvSpPr>
+        <p:spPr>
+          <a:xfrm>
+            <a:off x="0" y="836712"/>
+            <a:ext cx="9144000" cy="461665"/>
+          </a:xfrm>
+          <a:prstGeom prst="rect">
+            <a:avLst/>
+          </a:prstGeom>
+          <a:noFill/>
+        </p:spPr>
+        <p:txBody>
+          <a:bodyPr wrap="square" rtlCol="0">
+            <a:spAutoFit/>
+          </a:bodyPr>
+          <a:lstStyle/>
+          <a:p>
+            <a:pPr algn="ctr"/>
+            <a:r>
+              <a:rPr lang="pt-BR" sz="2400" b="1" dirty="0">
+                <a:latin typeface="Arial" pitchFamily="34" charset="0"/>
+                <a:cs typeface="Arial" pitchFamily="34" charset="0"/>
+              </a:rPr>
+              <a:t>Cenário: Efetivar Matrícula</a:t>
+            </a:r>
+          </a:p>
+        </p:txBody>
+      </p:sp>
+      <p:pic>
+        <p:nvPicPr>
+          <p:cNvPr id="5" name="Imagem 4" descr="Diagrama&#10;&#10;Descrição gerada automaticamente com confiança média">
+            <a:extLst>
+              <a:ext uri="{FF2B5EF4-FFF2-40B4-BE49-F238E27FC236}">
+                <a16:creationId xmlns:a16="http://schemas.microsoft.com/office/drawing/2014/main" id="{31BB0D80-3544-4756-B577-254573CCC19E}"/>
+              </a:ext>
+            </a:extLst>
+          </p:cNvPr>
+          <p:cNvPicPr>
+            <a:picLocks noChangeAspect="1"/>
+          </p:cNvPicPr>
+          <p:nvPr/>
+        </p:nvPicPr>
+        <p:blipFill>
+          <a:blip r:embed="rId2">
+            <a:extLst>
+              <a:ext uri="{28A0092B-C50C-407E-A947-70E740481C1C}">
+                <a14:useLocalDpi xmlns:a14="http://schemas.microsoft.com/office/drawing/2010/main" val="0"/>
+              </a:ext>
+            </a:extLst>
+          </a:blip>
+          <a:stretch>
+            <a:fillRect/>
+          </a:stretch>
+        </p:blipFill>
+        <p:spPr>
+          <a:xfrm>
+            <a:off x="657225" y="1781175"/>
+            <a:ext cx="7829550" cy="3295650"/>
+          </a:xfrm>
+          <a:prstGeom prst="rect">
+            <a:avLst/>
+          </a:prstGeom>
+        </p:spPr>
+      </p:pic>
+    </p:spTree>
+    <p:extLst>
+      <p:ext uri="{BB962C8B-B14F-4D97-AF65-F5344CB8AC3E}">
+        <p14:creationId xmlns:p14="http://schemas.microsoft.com/office/powerpoint/2010/main" val="1640424654"/>
       </p:ext>
     </p:extLst>
   </p:cSld>

</xml_diff>

<commit_message>
Artefatos 15 - 19 atualizados
</commit_message>
<xml_diff>
--- a/Artefatos/15 - Arquitetura de Negócio para cada Cenário.pptx
+++ b/Artefatos/15 - Arquitetura de Negócio para cada Cenário.pptx
@@ -134,13 +134,45 @@
 <file path=ppt/revisionInfo.xml><?xml version="1.0" encoding="utf-8"?>
 <p1510:revInfo xmlns:a="http://schemas.openxmlformats.org/drawingml/2006/main" xmlns:r="http://schemas.openxmlformats.org/officeDocument/2006/relationships" xmlns:p1510="http://schemas.microsoft.com/office/powerpoint/2015/10/main">
   <p1510:revLst>
-    <p1510:client id="{61F3FE0D-A57B-43EB-BDF0-4569B707A8FE}" v="13" dt="2021-03-30T19:33:18.001"/>
+    <p1510:client id="{31103393-B979-435A-AD0E-E799485B838B}" v="1" dt="2021-04-09T23:33:11.821"/>
   </p1510:revLst>
 </p1510:revInfo>
 </file>
 
 <file path=ppt/changesInfos/changesInfo1.xml><?xml version="1.0" encoding="utf-8"?>
 <pc:chgInfo xmlns:a="http://schemas.openxmlformats.org/drawingml/2006/main" xmlns:r="http://schemas.openxmlformats.org/officeDocument/2006/relationships" xmlns:ac="http://schemas.microsoft.com/office/drawing/2013/main/command" xmlns:pc="http://schemas.microsoft.com/office/powerpoint/2013/main/command">
+  <pc:docChgLst>
+    <pc:chgData name="Leonardo Zabotto" userId="e90e968d6f8cb6a5" providerId="LiveId" clId="{31103393-B979-435A-AD0E-E799485B838B}"/>
+    <pc:docChg chg="custSel modSld">
+      <pc:chgData name="Leonardo Zabotto" userId="e90e968d6f8cb6a5" providerId="LiveId" clId="{31103393-B979-435A-AD0E-E799485B838B}" dt="2021-04-09T23:33:18.008" v="5" actId="1076"/>
+      <pc:docMkLst>
+        <pc:docMk/>
+      </pc:docMkLst>
+      <pc:sldChg chg="addSp delSp modSp mod">
+        <pc:chgData name="Leonardo Zabotto" userId="e90e968d6f8cb6a5" providerId="LiveId" clId="{31103393-B979-435A-AD0E-E799485B838B}" dt="2021-04-09T23:33:18.008" v="5" actId="1076"/>
+        <pc:sldMkLst>
+          <pc:docMk/>
+          <pc:sldMk cId="3072961784" sldId="264"/>
+        </pc:sldMkLst>
+        <pc:picChg chg="add mod">
+          <ac:chgData name="Leonardo Zabotto" userId="e90e968d6f8cb6a5" providerId="LiveId" clId="{31103393-B979-435A-AD0E-E799485B838B}" dt="2021-04-09T23:33:18.008" v="5" actId="1076"/>
+          <ac:picMkLst>
+            <pc:docMk/>
+            <pc:sldMk cId="3072961784" sldId="264"/>
+            <ac:picMk id="4" creationId="{0C096BFF-F7D8-4093-91D9-DB5FA29CFBF8}"/>
+          </ac:picMkLst>
+        </pc:picChg>
+        <pc:picChg chg="del">
+          <ac:chgData name="Leonardo Zabotto" userId="e90e968d6f8cb6a5" providerId="LiveId" clId="{31103393-B979-435A-AD0E-E799485B838B}" dt="2021-04-09T23:33:05.344" v="0" actId="478"/>
+          <ac:picMkLst>
+            <pc:docMk/>
+            <pc:sldMk cId="3072961784" sldId="264"/>
+            <ac:picMk id="5" creationId="{5F5BEAF5-9E9C-4E13-9907-C449CB1DF014}"/>
+          </ac:picMkLst>
+        </pc:picChg>
+      </pc:sldChg>
+    </pc:docChg>
+  </pc:docChgLst>
   <pc:docChgLst>
     <pc:chgData name="Leonardo Zabotto" userId="e90e968d6f8cb6a5" providerId="LiveId" clId="{61F3FE0D-A57B-43EB-BDF0-4569B707A8FE}"/>
     <pc:docChg chg="undo custSel addSld modSld">
@@ -492,7 +524,7 @@
           <a:p>
             <a:fld id="{F746C99E-1662-4343-82EB-EE2952C19028}" type="datetimeFigureOut">
               <a:rPr lang="pt-BR" smtClean="0"/>
-              <a:t>08/04/2021</a:t>
+              <a:t>09/04/2021</a:t>
             </a:fld>
             <a:endParaRPr lang="pt-BR"/>
           </a:p>
@@ -1022,7 +1054,7 @@
           <a:p>
             <a:fld id="{080DFA31-8C8A-4704-967F-6616FC98D181}" type="datetimeFigureOut">
               <a:rPr lang="pt-BR" smtClean="0"/>
-              <a:t>08/04/2021</a:t>
+              <a:t>09/04/2021</a:t>
             </a:fld>
             <a:endParaRPr lang="pt-BR"/>
           </a:p>
@@ -1190,7 +1222,7 @@
           <a:p>
             <a:fld id="{080DFA31-8C8A-4704-967F-6616FC98D181}" type="datetimeFigureOut">
               <a:rPr lang="pt-BR" smtClean="0"/>
-              <a:t>08/04/2021</a:t>
+              <a:t>09/04/2021</a:t>
             </a:fld>
             <a:endParaRPr lang="pt-BR"/>
           </a:p>
@@ -1368,7 +1400,7 @@
           <a:p>
             <a:fld id="{080DFA31-8C8A-4704-967F-6616FC98D181}" type="datetimeFigureOut">
               <a:rPr lang="pt-BR" smtClean="0"/>
-              <a:t>08/04/2021</a:t>
+              <a:t>09/04/2021</a:t>
             </a:fld>
             <a:endParaRPr lang="pt-BR"/>
           </a:p>
@@ -1536,7 +1568,7 @@
           <a:p>
             <a:fld id="{080DFA31-8C8A-4704-967F-6616FC98D181}" type="datetimeFigureOut">
               <a:rPr lang="pt-BR" smtClean="0"/>
-              <a:t>08/04/2021</a:t>
+              <a:t>09/04/2021</a:t>
             </a:fld>
             <a:endParaRPr lang="pt-BR"/>
           </a:p>
@@ -1781,7 +1813,7 @@
           <a:p>
             <a:fld id="{080DFA31-8C8A-4704-967F-6616FC98D181}" type="datetimeFigureOut">
               <a:rPr lang="pt-BR" smtClean="0"/>
-              <a:t>08/04/2021</a:t>
+              <a:t>09/04/2021</a:t>
             </a:fld>
             <a:endParaRPr lang="pt-BR"/>
           </a:p>
@@ -2066,7 +2098,7 @@
           <a:p>
             <a:fld id="{080DFA31-8C8A-4704-967F-6616FC98D181}" type="datetimeFigureOut">
               <a:rPr lang="pt-BR" smtClean="0"/>
-              <a:t>08/04/2021</a:t>
+              <a:t>09/04/2021</a:t>
             </a:fld>
             <a:endParaRPr lang="pt-BR"/>
           </a:p>
@@ -2485,7 +2517,7 @@
           <a:p>
             <a:fld id="{080DFA31-8C8A-4704-967F-6616FC98D181}" type="datetimeFigureOut">
               <a:rPr lang="pt-BR" smtClean="0"/>
-              <a:t>08/04/2021</a:t>
+              <a:t>09/04/2021</a:t>
             </a:fld>
             <a:endParaRPr lang="pt-BR"/>
           </a:p>
@@ -2602,7 +2634,7 @@
           <a:p>
             <a:fld id="{080DFA31-8C8A-4704-967F-6616FC98D181}" type="datetimeFigureOut">
               <a:rPr lang="pt-BR" smtClean="0"/>
-              <a:t>08/04/2021</a:t>
+              <a:t>09/04/2021</a:t>
             </a:fld>
             <a:endParaRPr lang="pt-BR"/>
           </a:p>
@@ -2697,7 +2729,7 @@
           <a:p>
             <a:fld id="{080DFA31-8C8A-4704-967F-6616FC98D181}" type="datetimeFigureOut">
               <a:rPr lang="pt-BR" smtClean="0"/>
-              <a:t>08/04/2021</a:t>
+              <a:t>09/04/2021</a:t>
             </a:fld>
             <a:endParaRPr lang="pt-BR"/>
           </a:p>
@@ -2972,7 +3004,7 @@
           <a:p>
             <a:fld id="{080DFA31-8C8A-4704-967F-6616FC98D181}" type="datetimeFigureOut">
               <a:rPr lang="pt-BR" smtClean="0"/>
-              <a:t>08/04/2021</a:t>
+              <a:t>09/04/2021</a:t>
             </a:fld>
             <a:endParaRPr lang="pt-BR"/>
           </a:p>
@@ -3224,7 +3256,7 @@
           <a:p>
             <a:fld id="{080DFA31-8C8A-4704-967F-6616FC98D181}" type="datetimeFigureOut">
               <a:rPr lang="pt-BR" smtClean="0"/>
-              <a:t>08/04/2021</a:t>
+              <a:t>09/04/2021</a:t>
             </a:fld>
             <a:endParaRPr lang="pt-BR"/>
           </a:p>
@@ -3435,7 +3467,7 @@
           <a:p>
             <a:fld id="{080DFA31-8C8A-4704-967F-6616FC98D181}" type="datetimeFigureOut">
               <a:rPr lang="pt-BR" smtClean="0"/>
-              <a:t>08/04/2021</a:t>
+              <a:t>09/04/2021</a:t>
             </a:fld>
             <a:endParaRPr lang="pt-BR"/>
           </a:p>
@@ -4142,10 +4174,10 @@
       </p:sp>
       <p:pic>
         <p:nvPicPr>
-          <p:cNvPr id="5" name="Imagem 4" descr="Uma imagem contendo Diagrama&#10;&#10;Descrição gerada automaticamente">
+          <p:cNvPr id="4" name="Imagem 3" descr="Diagrama&#10;&#10;Descrição gerada automaticamente">
             <a:extLst>
               <a:ext uri="{FF2B5EF4-FFF2-40B4-BE49-F238E27FC236}">
-                <a16:creationId xmlns:a16="http://schemas.microsoft.com/office/drawing/2014/main" id="{5F5BEAF5-9E9C-4E13-9907-C449CB1DF014}"/>
+                <a16:creationId xmlns:a16="http://schemas.microsoft.com/office/drawing/2014/main" id="{0C096BFF-F7D8-4093-91D9-DB5FA29CFBF8}"/>
               </a:ext>
             </a:extLst>
           </p:cNvPr>
@@ -4168,8 +4200,8 @@
         </p:blipFill>
         <p:spPr>
           <a:xfrm>
-            <a:off x="566737" y="1781175"/>
-            <a:ext cx="8010525" cy="3295650"/>
+            <a:off x="593812" y="2166199"/>
+            <a:ext cx="7956376" cy="2525602"/>
           </a:xfrm>
           <a:prstGeom prst="rect">
             <a:avLst/>

</xml_diff>